<commit_message>
Convergence sensitivity with plot in report
</commit_message>
<xml_diff>
--- a/Figuras.pptx
+++ b/Figuras.pptx
@@ -9,6 +9,7 @@
     <p:sldId id="257" r:id="rId3"/>
     <p:sldId id="258" r:id="rId4"/>
     <p:sldId id="259" r:id="rId5"/>
+    <p:sldId id="260" r:id="rId6"/>
   </p:sldIdLst>
   <p:sldSz cx="12192000" cy="6858000"/>
   <p:notesSz cx="6858000" cy="9144000"/>
@@ -107,6 +108,11 @@
       </a:defRPr>
     </a:lvl9pPr>
   </p:defaultTextStyle>
+  <p:extLst>
+    <p:ext uri="{EFAFB233-063F-42B5-8137-9DF3F51BA10A}">
+      <p15:sldGuideLst xmlns:p15="http://schemas.microsoft.com/office/powerpoint/2012/main"/>
+    </p:ext>
+  </p:extLst>
 </p:presentation>
 </file>
 
@@ -257,7 +263,7 @@
           <a:p>
             <a:fld id="{8CAC8733-FF99-4FDB-8903-4586A309A709}" type="datetimeFigureOut">
               <a:rPr lang="pt-BR" smtClean="0"/>
-              <a:t>28/08/2023</a:t>
+              <a:t>29/08/2023</a:t>
             </a:fld>
             <a:endParaRPr lang="pt-BR"/>
           </a:p>
@@ -455,7 +461,7 @@
           <a:p>
             <a:fld id="{8CAC8733-FF99-4FDB-8903-4586A309A709}" type="datetimeFigureOut">
               <a:rPr lang="pt-BR" smtClean="0"/>
-              <a:t>28/08/2023</a:t>
+              <a:t>29/08/2023</a:t>
             </a:fld>
             <a:endParaRPr lang="pt-BR"/>
           </a:p>
@@ -663,7 +669,7 @@
           <a:p>
             <a:fld id="{8CAC8733-FF99-4FDB-8903-4586A309A709}" type="datetimeFigureOut">
               <a:rPr lang="pt-BR" smtClean="0"/>
-              <a:t>28/08/2023</a:t>
+              <a:t>29/08/2023</a:t>
             </a:fld>
             <a:endParaRPr lang="pt-BR"/>
           </a:p>
@@ -861,7 +867,7 @@
           <a:p>
             <a:fld id="{8CAC8733-FF99-4FDB-8903-4586A309A709}" type="datetimeFigureOut">
               <a:rPr lang="pt-BR" smtClean="0"/>
-              <a:t>28/08/2023</a:t>
+              <a:t>29/08/2023</a:t>
             </a:fld>
             <a:endParaRPr lang="pt-BR"/>
           </a:p>
@@ -1136,7 +1142,7 @@
           <a:p>
             <a:fld id="{8CAC8733-FF99-4FDB-8903-4586A309A709}" type="datetimeFigureOut">
               <a:rPr lang="pt-BR" smtClean="0"/>
-              <a:t>28/08/2023</a:t>
+              <a:t>29/08/2023</a:t>
             </a:fld>
             <a:endParaRPr lang="pt-BR"/>
           </a:p>
@@ -1401,7 +1407,7 @@
           <a:p>
             <a:fld id="{8CAC8733-FF99-4FDB-8903-4586A309A709}" type="datetimeFigureOut">
               <a:rPr lang="pt-BR" smtClean="0"/>
-              <a:t>28/08/2023</a:t>
+              <a:t>29/08/2023</a:t>
             </a:fld>
             <a:endParaRPr lang="pt-BR"/>
           </a:p>
@@ -1813,7 +1819,7 @@
           <a:p>
             <a:fld id="{8CAC8733-FF99-4FDB-8903-4586A309A709}" type="datetimeFigureOut">
               <a:rPr lang="pt-BR" smtClean="0"/>
-              <a:t>28/08/2023</a:t>
+              <a:t>29/08/2023</a:t>
             </a:fld>
             <a:endParaRPr lang="pt-BR"/>
           </a:p>
@@ -1954,7 +1960,7 @@
           <a:p>
             <a:fld id="{8CAC8733-FF99-4FDB-8903-4586A309A709}" type="datetimeFigureOut">
               <a:rPr lang="pt-BR" smtClean="0"/>
-              <a:t>28/08/2023</a:t>
+              <a:t>29/08/2023</a:t>
             </a:fld>
             <a:endParaRPr lang="pt-BR"/>
           </a:p>
@@ -2067,7 +2073,7 @@
           <a:p>
             <a:fld id="{8CAC8733-FF99-4FDB-8903-4586A309A709}" type="datetimeFigureOut">
               <a:rPr lang="pt-BR" smtClean="0"/>
-              <a:t>28/08/2023</a:t>
+              <a:t>29/08/2023</a:t>
             </a:fld>
             <a:endParaRPr lang="pt-BR"/>
           </a:p>
@@ -2378,7 +2384,7 @@
           <a:p>
             <a:fld id="{8CAC8733-FF99-4FDB-8903-4586A309A709}" type="datetimeFigureOut">
               <a:rPr lang="pt-BR" smtClean="0"/>
-              <a:t>28/08/2023</a:t>
+              <a:t>29/08/2023</a:t>
             </a:fld>
             <a:endParaRPr lang="pt-BR"/>
           </a:p>
@@ -2666,7 +2672,7 @@
           <a:p>
             <a:fld id="{8CAC8733-FF99-4FDB-8903-4586A309A709}" type="datetimeFigureOut">
               <a:rPr lang="pt-BR" smtClean="0"/>
-              <a:t>28/08/2023</a:t>
+              <a:t>29/08/2023</a:t>
             </a:fld>
             <a:endParaRPr lang="pt-BR"/>
           </a:p>
@@ -2907,7 +2913,7 @@
           <a:p>
             <a:fld id="{8CAC8733-FF99-4FDB-8903-4586A309A709}" type="datetimeFigureOut">
               <a:rPr lang="pt-BR" smtClean="0"/>
-              <a:t>28/08/2023</a:t>
+              <a:t>29/08/2023</a:t>
             </a:fld>
             <a:endParaRPr lang="pt-BR"/>
           </a:p>
@@ -5799,10 +5805,10 @@
       </p:grpSpPr>
       <p:grpSp>
         <p:nvGrpSpPr>
-          <p:cNvPr id="2" name="Agrupar 1">
-            <a:extLst>
-              <a:ext uri="{FF2B5EF4-FFF2-40B4-BE49-F238E27FC236}">
-                <a16:creationId xmlns:a16="http://schemas.microsoft.com/office/drawing/2014/main" id="{9C01167C-81FB-B183-9A42-785C8980C5FD}"/>
+          <p:cNvPr id="16" name="Agrupar 15">
+            <a:extLst>
+              <a:ext uri="{FF2B5EF4-FFF2-40B4-BE49-F238E27FC236}">
+                <a16:creationId xmlns:a16="http://schemas.microsoft.com/office/drawing/2014/main" id="{0B52CEE7-73CD-BD82-80EA-EF886BA2F58D}"/>
               </a:ext>
             </a:extLst>
           </p:cNvPr>
@@ -5811,18 +5817,454 @@
         </p:nvGrpSpPr>
         <p:grpSpPr>
           <a:xfrm>
-            <a:off x="2823882" y="820270"/>
-            <a:ext cx="5916706" cy="4675095"/>
-            <a:chOff x="2823882" y="820270"/>
-            <a:chExt cx="5916706" cy="4675095"/>
+            <a:off x="1068720" y="203957"/>
+            <a:ext cx="8811880" cy="5886627"/>
+            <a:chOff x="1068720" y="203957"/>
+            <a:chExt cx="8811880" cy="5886627"/>
           </a:xfrm>
         </p:grpSpPr>
+        <p:grpSp>
+          <p:nvGrpSpPr>
+            <p:cNvPr id="2" name="Agrupar 1">
+              <a:extLst>
+                <a:ext uri="{FF2B5EF4-FFF2-40B4-BE49-F238E27FC236}">
+                  <a16:creationId xmlns:a16="http://schemas.microsoft.com/office/drawing/2014/main" id="{9C01167C-81FB-B183-9A42-785C8980C5FD}"/>
+                </a:ext>
+              </a:extLst>
+            </p:cNvPr>
+            <p:cNvGrpSpPr/>
+            <p:nvPr/>
+          </p:nvGrpSpPr>
+          <p:grpSpPr>
+            <a:xfrm>
+              <a:off x="2823882" y="820270"/>
+              <a:ext cx="5916706" cy="4675095"/>
+              <a:chOff x="2823882" y="820270"/>
+              <a:chExt cx="5916706" cy="4675095"/>
+            </a:xfrm>
+          </p:grpSpPr>
+          <p:sp>
+            <p:nvSpPr>
+              <p:cNvPr id="5" name="Retângulo 4">
+                <a:extLst>
+                  <a:ext uri="{FF2B5EF4-FFF2-40B4-BE49-F238E27FC236}">
+                    <a16:creationId xmlns:a16="http://schemas.microsoft.com/office/drawing/2014/main" id="{72CF10DF-9261-F84E-498D-A14658A28EE0}"/>
+                  </a:ext>
+                </a:extLst>
+              </p:cNvPr>
+              <p:cNvSpPr/>
+              <p:nvPr/>
+            </p:nvSpPr>
+            <p:spPr>
+              <a:xfrm>
+                <a:off x="2823882" y="2277035"/>
+                <a:ext cx="4213412" cy="3218330"/>
+              </a:xfrm>
+              <a:prstGeom prst="rect">
+                <a:avLst/>
+              </a:prstGeom>
+              <a:noFill/>
+              <a:ln w="19050">
+                <a:solidFill>
+                  <a:schemeClr val="tx1"/>
+                </a:solidFill>
+              </a:ln>
+            </p:spPr>
+            <p:style>
+              <a:lnRef idx="2">
+                <a:schemeClr val="accent1">
+                  <a:shade val="15000"/>
+                </a:schemeClr>
+              </a:lnRef>
+              <a:fillRef idx="1">
+                <a:schemeClr val="accent1"/>
+              </a:fillRef>
+              <a:effectRef idx="0">
+                <a:schemeClr val="accent1"/>
+              </a:effectRef>
+              <a:fontRef idx="minor">
+                <a:schemeClr val="lt1"/>
+              </a:fontRef>
+            </p:style>
+            <p:txBody>
+              <a:bodyPr rtlCol="0" anchor="ctr"/>
+              <a:lstStyle/>
+              <a:p>
+                <a:pPr algn="ctr"/>
+                <a:endParaRPr lang="pt-BR"/>
+              </a:p>
+            </p:txBody>
+          </p:sp>
+          <p:cxnSp>
+            <p:nvCxnSpPr>
+              <p:cNvPr id="8" name="Conector reto 7">
+                <a:extLst>
+                  <a:ext uri="{FF2B5EF4-FFF2-40B4-BE49-F238E27FC236}">
+                    <a16:creationId xmlns:a16="http://schemas.microsoft.com/office/drawing/2014/main" id="{A8420B48-6FFA-B47C-6FC5-57A9F5708009}"/>
+                  </a:ext>
+                </a:extLst>
+              </p:cNvPr>
+              <p:cNvCxnSpPr/>
+              <p:nvPr/>
+            </p:nvCxnSpPr>
+            <p:spPr>
+              <a:xfrm flipV="1">
+                <a:off x="2823882" y="820270"/>
+                <a:ext cx="1703294" cy="1456765"/>
+              </a:xfrm>
+              <a:prstGeom prst="line">
+                <a:avLst/>
+              </a:prstGeom>
+              <a:noFill/>
+              <a:ln w="19050">
+                <a:solidFill>
+                  <a:schemeClr val="tx1"/>
+                </a:solidFill>
+              </a:ln>
+            </p:spPr>
+            <p:style>
+              <a:lnRef idx="2">
+                <a:schemeClr val="accent1">
+                  <a:shade val="15000"/>
+                </a:schemeClr>
+              </a:lnRef>
+              <a:fillRef idx="1">
+                <a:schemeClr val="accent1"/>
+              </a:fillRef>
+              <a:effectRef idx="0">
+                <a:schemeClr val="accent1"/>
+              </a:effectRef>
+              <a:fontRef idx="minor">
+                <a:schemeClr val="lt1"/>
+              </a:fontRef>
+            </p:style>
+          </p:cxnSp>
+          <p:cxnSp>
+            <p:nvCxnSpPr>
+              <p:cNvPr id="9" name="Conector reto 8">
+                <a:extLst>
+                  <a:ext uri="{FF2B5EF4-FFF2-40B4-BE49-F238E27FC236}">
+                    <a16:creationId xmlns:a16="http://schemas.microsoft.com/office/drawing/2014/main" id="{55C465CB-9276-4EDE-695B-8EA199064A40}"/>
+                  </a:ext>
+                </a:extLst>
+              </p:cNvPr>
+              <p:cNvCxnSpPr/>
+              <p:nvPr/>
+            </p:nvCxnSpPr>
+            <p:spPr>
+              <a:xfrm flipV="1">
+                <a:off x="7037294" y="820270"/>
+                <a:ext cx="1703294" cy="1456765"/>
+              </a:xfrm>
+              <a:prstGeom prst="line">
+                <a:avLst/>
+              </a:prstGeom>
+              <a:noFill/>
+              <a:ln w="19050">
+                <a:solidFill>
+                  <a:schemeClr val="tx1"/>
+                </a:solidFill>
+              </a:ln>
+            </p:spPr>
+            <p:style>
+              <a:lnRef idx="2">
+                <a:schemeClr val="accent1">
+                  <a:shade val="15000"/>
+                </a:schemeClr>
+              </a:lnRef>
+              <a:fillRef idx="1">
+                <a:schemeClr val="accent1"/>
+              </a:fillRef>
+              <a:effectRef idx="0">
+                <a:schemeClr val="accent1"/>
+              </a:effectRef>
+              <a:fontRef idx="minor">
+                <a:schemeClr val="lt1"/>
+              </a:fontRef>
+            </p:style>
+          </p:cxnSp>
+          <p:cxnSp>
+            <p:nvCxnSpPr>
+              <p:cNvPr id="10" name="Conector reto 9">
+                <a:extLst>
+                  <a:ext uri="{FF2B5EF4-FFF2-40B4-BE49-F238E27FC236}">
+                    <a16:creationId xmlns:a16="http://schemas.microsoft.com/office/drawing/2014/main" id="{32746068-F31F-DAD6-1739-65DA727743AE}"/>
+                  </a:ext>
+                </a:extLst>
+              </p:cNvPr>
+              <p:cNvCxnSpPr/>
+              <p:nvPr/>
+            </p:nvCxnSpPr>
+            <p:spPr>
+              <a:xfrm flipV="1">
+                <a:off x="7037294" y="4038600"/>
+                <a:ext cx="1703294" cy="1456765"/>
+              </a:xfrm>
+              <a:prstGeom prst="line">
+                <a:avLst/>
+              </a:prstGeom>
+              <a:noFill/>
+              <a:ln w="19050">
+                <a:solidFill>
+                  <a:schemeClr val="tx1"/>
+                </a:solidFill>
+              </a:ln>
+            </p:spPr>
+            <p:style>
+              <a:lnRef idx="2">
+                <a:schemeClr val="accent1">
+                  <a:shade val="15000"/>
+                </a:schemeClr>
+              </a:lnRef>
+              <a:fillRef idx="1">
+                <a:schemeClr val="accent1"/>
+              </a:fillRef>
+              <a:effectRef idx="0">
+                <a:schemeClr val="accent1"/>
+              </a:effectRef>
+              <a:fontRef idx="minor">
+                <a:schemeClr val="lt1"/>
+              </a:fontRef>
+            </p:style>
+          </p:cxnSp>
+          <p:cxnSp>
+            <p:nvCxnSpPr>
+              <p:cNvPr id="11" name="Conector reto 10">
+                <a:extLst>
+                  <a:ext uri="{FF2B5EF4-FFF2-40B4-BE49-F238E27FC236}">
+                    <a16:creationId xmlns:a16="http://schemas.microsoft.com/office/drawing/2014/main" id="{6289377A-18D2-23DF-A975-92DD5BE0BE31}"/>
+                  </a:ext>
+                </a:extLst>
+              </p:cNvPr>
+              <p:cNvCxnSpPr/>
+              <p:nvPr/>
+            </p:nvCxnSpPr>
+            <p:spPr>
+              <a:xfrm flipV="1">
+                <a:off x="2823882" y="4038599"/>
+                <a:ext cx="1703294" cy="1456765"/>
+              </a:xfrm>
+              <a:prstGeom prst="line">
+                <a:avLst/>
+              </a:prstGeom>
+              <a:noFill/>
+              <a:ln w="19050">
+                <a:solidFill>
+                  <a:schemeClr val="tx1"/>
+                </a:solidFill>
+                <a:prstDash val="dash"/>
+              </a:ln>
+            </p:spPr>
+            <p:style>
+              <a:lnRef idx="2">
+                <a:schemeClr val="accent1">
+                  <a:shade val="15000"/>
+                </a:schemeClr>
+              </a:lnRef>
+              <a:fillRef idx="1">
+                <a:schemeClr val="accent1"/>
+              </a:fillRef>
+              <a:effectRef idx="0">
+                <a:schemeClr val="accent1"/>
+              </a:effectRef>
+              <a:fontRef idx="minor">
+                <a:schemeClr val="lt1"/>
+              </a:fontRef>
+            </p:style>
+          </p:cxnSp>
+          <p:cxnSp>
+            <p:nvCxnSpPr>
+              <p:cNvPr id="7" name="Conector reto 6">
+                <a:extLst>
+                  <a:ext uri="{FF2B5EF4-FFF2-40B4-BE49-F238E27FC236}">
+                    <a16:creationId xmlns:a16="http://schemas.microsoft.com/office/drawing/2014/main" id="{1F045A3F-B20A-FBF0-12F2-2967C17A7B20}"/>
+                  </a:ext>
+                </a:extLst>
+              </p:cNvPr>
+              <p:cNvCxnSpPr>
+                <a:cxnSpLocks/>
+              </p:cNvCxnSpPr>
+              <p:nvPr/>
+            </p:nvCxnSpPr>
+            <p:spPr>
+              <a:xfrm flipH="1">
+                <a:off x="4527176" y="820270"/>
+                <a:ext cx="4213412" cy="0"/>
+              </a:xfrm>
+              <a:prstGeom prst="line">
+                <a:avLst/>
+              </a:prstGeom>
+              <a:noFill/>
+              <a:ln w="19050">
+                <a:solidFill>
+                  <a:schemeClr val="tx1"/>
+                </a:solidFill>
+              </a:ln>
+            </p:spPr>
+            <p:style>
+              <a:lnRef idx="2">
+                <a:schemeClr val="accent1">
+                  <a:shade val="15000"/>
+                </a:schemeClr>
+              </a:lnRef>
+              <a:fillRef idx="1">
+                <a:schemeClr val="accent1"/>
+              </a:fillRef>
+              <a:effectRef idx="0">
+                <a:schemeClr val="accent1"/>
+              </a:effectRef>
+              <a:fontRef idx="minor">
+                <a:schemeClr val="lt1"/>
+              </a:fontRef>
+            </p:style>
+          </p:cxnSp>
+          <p:cxnSp>
+            <p:nvCxnSpPr>
+              <p:cNvPr id="14" name="Conector reto 13">
+                <a:extLst>
+                  <a:ext uri="{FF2B5EF4-FFF2-40B4-BE49-F238E27FC236}">
+                    <a16:creationId xmlns:a16="http://schemas.microsoft.com/office/drawing/2014/main" id="{266C85B1-2203-61B6-AF9A-95BB89CE1733}"/>
+                  </a:ext>
+                </a:extLst>
+              </p:cNvPr>
+              <p:cNvCxnSpPr>
+                <a:cxnSpLocks/>
+              </p:cNvCxnSpPr>
+              <p:nvPr/>
+            </p:nvCxnSpPr>
+            <p:spPr>
+              <a:xfrm flipV="1">
+                <a:off x="8740588" y="820270"/>
+                <a:ext cx="0" cy="3218329"/>
+              </a:xfrm>
+              <a:prstGeom prst="line">
+                <a:avLst/>
+              </a:prstGeom>
+              <a:noFill/>
+              <a:ln w="19050">
+                <a:solidFill>
+                  <a:schemeClr val="tx1"/>
+                </a:solidFill>
+              </a:ln>
+            </p:spPr>
+            <p:style>
+              <a:lnRef idx="2">
+                <a:schemeClr val="accent1">
+                  <a:shade val="15000"/>
+                </a:schemeClr>
+              </a:lnRef>
+              <a:fillRef idx="1">
+                <a:schemeClr val="accent1"/>
+              </a:fillRef>
+              <a:effectRef idx="0">
+                <a:schemeClr val="accent1"/>
+              </a:effectRef>
+              <a:fontRef idx="minor">
+                <a:schemeClr val="lt1"/>
+              </a:fontRef>
+            </p:style>
+          </p:cxnSp>
+          <p:cxnSp>
+            <p:nvCxnSpPr>
+              <p:cNvPr id="20" name="Conector reto 19">
+                <a:extLst>
+                  <a:ext uri="{FF2B5EF4-FFF2-40B4-BE49-F238E27FC236}">
+                    <a16:creationId xmlns:a16="http://schemas.microsoft.com/office/drawing/2014/main" id="{C1C80C8D-BA97-95C3-E58D-45A16166F13D}"/>
+                  </a:ext>
+                </a:extLst>
+              </p:cNvPr>
+              <p:cNvCxnSpPr>
+                <a:cxnSpLocks/>
+              </p:cNvCxnSpPr>
+              <p:nvPr/>
+            </p:nvCxnSpPr>
+            <p:spPr>
+              <a:xfrm flipV="1">
+                <a:off x="4527176" y="820270"/>
+                <a:ext cx="0" cy="3218329"/>
+              </a:xfrm>
+              <a:prstGeom prst="line">
+                <a:avLst/>
+              </a:prstGeom>
+              <a:noFill/>
+              <a:ln w="19050">
+                <a:solidFill>
+                  <a:schemeClr val="tx1"/>
+                </a:solidFill>
+                <a:prstDash val="dash"/>
+              </a:ln>
+            </p:spPr>
+            <p:style>
+              <a:lnRef idx="2">
+                <a:schemeClr val="accent1">
+                  <a:shade val="15000"/>
+                </a:schemeClr>
+              </a:lnRef>
+              <a:fillRef idx="1">
+                <a:schemeClr val="accent1"/>
+              </a:fillRef>
+              <a:effectRef idx="0">
+                <a:schemeClr val="accent1"/>
+              </a:effectRef>
+              <a:fontRef idx="minor">
+                <a:schemeClr val="lt1"/>
+              </a:fontRef>
+            </p:style>
+          </p:cxnSp>
+          <p:cxnSp>
+            <p:nvCxnSpPr>
+              <p:cNvPr id="21" name="Conector reto 20">
+                <a:extLst>
+                  <a:ext uri="{FF2B5EF4-FFF2-40B4-BE49-F238E27FC236}">
+                    <a16:creationId xmlns:a16="http://schemas.microsoft.com/office/drawing/2014/main" id="{3515D2A6-642A-DFF1-211D-8D6E9C07D49A}"/>
+                  </a:ext>
+                </a:extLst>
+              </p:cNvPr>
+              <p:cNvCxnSpPr>
+                <a:cxnSpLocks/>
+              </p:cNvCxnSpPr>
+              <p:nvPr/>
+            </p:nvCxnSpPr>
+            <p:spPr>
+              <a:xfrm flipH="1">
+                <a:off x="4527176" y="4035909"/>
+                <a:ext cx="4213412" cy="0"/>
+              </a:xfrm>
+              <a:prstGeom prst="line">
+                <a:avLst/>
+              </a:prstGeom>
+              <a:noFill/>
+              <a:ln w="19050">
+                <a:solidFill>
+                  <a:schemeClr val="tx1"/>
+                </a:solidFill>
+                <a:prstDash val="dash"/>
+              </a:ln>
+            </p:spPr>
+            <p:style>
+              <a:lnRef idx="2">
+                <a:schemeClr val="accent1">
+                  <a:shade val="15000"/>
+                </a:schemeClr>
+              </a:lnRef>
+              <a:fillRef idx="1">
+                <a:schemeClr val="accent1"/>
+              </a:fillRef>
+              <a:effectRef idx="0">
+                <a:schemeClr val="accent1"/>
+              </a:effectRef>
+              <a:fontRef idx="minor">
+                <a:schemeClr val="lt1"/>
+              </a:fontRef>
+            </p:style>
+          </p:cxnSp>
+        </p:grpSp>
         <p:sp>
           <p:nvSpPr>
-            <p:cNvPr id="5" name="Retângulo 4">
+            <p:cNvPr id="3" name="Elipse 2">
               <a:extLst>
                 <a:ext uri="{FF2B5EF4-FFF2-40B4-BE49-F238E27FC236}">
-                  <a16:creationId xmlns:a16="http://schemas.microsoft.com/office/drawing/2014/main" id="{72CF10DF-9261-F84E-498D-A14658A28EE0}"/>
+                  <a16:creationId xmlns:a16="http://schemas.microsoft.com/office/drawing/2014/main" id="{D9613E0E-593B-E0C0-8B8B-399904E4123F}"/>
                 </a:ext>
               </a:extLst>
             </p:cNvPr>
@@ -5831,14 +6273,619 @@
           </p:nvSpPr>
           <p:spPr>
             <a:xfrm>
-              <a:off x="2823882" y="2277035"/>
-              <a:ext cx="4213412" cy="3218330"/>
+              <a:off x="2751881" y="2205036"/>
+              <a:ext cx="144000" cy="144000"/>
+            </a:xfrm>
+            <a:prstGeom prst="ellipse">
+              <a:avLst/>
+            </a:prstGeom>
+          </p:spPr>
+          <p:style>
+            <a:lnRef idx="2">
+              <a:schemeClr val="dk1">
+                <a:shade val="15000"/>
+              </a:schemeClr>
+            </a:lnRef>
+            <a:fillRef idx="1">
+              <a:schemeClr val="dk1"/>
+            </a:fillRef>
+            <a:effectRef idx="0">
+              <a:schemeClr val="dk1"/>
+            </a:effectRef>
+            <a:fontRef idx="minor">
+              <a:schemeClr val="lt1"/>
+            </a:fontRef>
+          </p:style>
+          <p:txBody>
+            <a:bodyPr rtlCol="0" anchor="ctr"/>
+            <a:lstStyle/>
+            <a:p>
+              <a:pPr algn="ctr"/>
+              <a:endParaRPr lang="pt-BR"/>
+            </a:p>
+          </p:txBody>
+        </p:sp>
+        <p:sp>
+          <p:nvSpPr>
+            <p:cNvPr id="4" name="Elipse 3">
+              <a:extLst>
+                <a:ext uri="{FF2B5EF4-FFF2-40B4-BE49-F238E27FC236}">
+                  <a16:creationId xmlns:a16="http://schemas.microsoft.com/office/drawing/2014/main" id="{917ECF6C-B02C-4443-1564-5F4E08A8AF67}"/>
+                </a:ext>
+              </a:extLst>
+            </p:cNvPr>
+            <p:cNvSpPr/>
+            <p:nvPr/>
+          </p:nvSpPr>
+          <p:spPr>
+            <a:xfrm>
+              <a:off x="8668588" y="3963909"/>
+              <a:ext cx="144000" cy="144000"/>
+            </a:xfrm>
+            <a:prstGeom prst="ellipse">
+              <a:avLst/>
+            </a:prstGeom>
+          </p:spPr>
+          <p:style>
+            <a:lnRef idx="2">
+              <a:schemeClr val="dk1">
+                <a:shade val="15000"/>
+              </a:schemeClr>
+            </a:lnRef>
+            <a:fillRef idx="1">
+              <a:schemeClr val="dk1"/>
+            </a:fillRef>
+            <a:effectRef idx="0">
+              <a:schemeClr val="dk1"/>
+            </a:effectRef>
+            <a:fontRef idx="minor">
+              <a:schemeClr val="lt1"/>
+            </a:fontRef>
+          </p:style>
+          <p:txBody>
+            <a:bodyPr rtlCol="0" anchor="ctr"/>
+            <a:lstStyle/>
+            <a:p>
+              <a:pPr algn="ctr"/>
+              <a:endParaRPr lang="pt-BR"/>
+            </a:p>
+          </p:txBody>
+        </p:sp>
+        <p:sp>
+          <p:nvSpPr>
+            <p:cNvPr id="6" name="CaixaDeTexto 5">
+              <a:extLst>
+                <a:ext uri="{FF2B5EF4-FFF2-40B4-BE49-F238E27FC236}">
+                  <a16:creationId xmlns:a16="http://schemas.microsoft.com/office/drawing/2014/main" id="{B0628146-486B-775E-2158-35EEA9C398BA}"/>
+                </a:ext>
+              </a:extLst>
+            </p:cNvPr>
+            <p:cNvSpPr txBox="1"/>
+            <p:nvPr/>
+          </p:nvSpPr>
+          <p:spPr>
+            <a:xfrm>
+              <a:off x="4724400" y="5567364"/>
+              <a:ext cx="566181" cy="523220"/>
             </a:xfrm>
             <a:prstGeom prst="rect">
               <a:avLst/>
             </a:prstGeom>
             <a:noFill/>
+          </p:spPr>
+          <p:txBody>
+            <a:bodyPr wrap="none" rtlCol="0">
+              <a:spAutoFit/>
+            </a:bodyPr>
+            <a:lstStyle/>
+            <a:p>
+              <a:r>
+                <a:rPr lang="el-GR" sz="2800" dirty="0"/>
+                <a:t>Δ</a:t>
+              </a:r>
+              <a:r>
+                <a:rPr lang="pt-BR" sz="2800" dirty="0"/>
+                <a:t>E</a:t>
+              </a:r>
+            </a:p>
+          </p:txBody>
+        </p:sp>
+        <p:sp>
+          <p:nvSpPr>
+            <p:cNvPr id="12" name="CaixaDeTexto 11">
+              <a:extLst>
+                <a:ext uri="{FF2B5EF4-FFF2-40B4-BE49-F238E27FC236}">
+                  <a16:creationId xmlns:a16="http://schemas.microsoft.com/office/drawing/2014/main" id="{FDD954E1-B0A3-F4EC-AAAF-1D0467022D90}"/>
+                </a:ext>
+              </a:extLst>
+            </p:cNvPr>
+            <p:cNvSpPr txBox="1"/>
+            <p:nvPr/>
+          </p:nvSpPr>
+          <p:spPr>
+            <a:xfrm>
+              <a:off x="2197656" y="3398980"/>
+              <a:ext cx="590226" cy="523220"/>
+            </a:xfrm>
+            <a:prstGeom prst="rect">
+              <a:avLst/>
+            </a:prstGeom>
+            <a:noFill/>
+          </p:spPr>
+          <p:txBody>
+            <a:bodyPr wrap="none" rtlCol="0">
+              <a:spAutoFit/>
+            </a:bodyPr>
+            <a:lstStyle/>
+            <a:p>
+              <a:r>
+                <a:rPr lang="el-GR" sz="2800" dirty="0"/>
+                <a:t>Δ</a:t>
+              </a:r>
+              <a:r>
+                <a:rPr lang="pt-BR" sz="2800" dirty="0"/>
+                <a:t>V</a:t>
+              </a:r>
+            </a:p>
+          </p:txBody>
+        </p:sp>
+        <p:sp>
+          <p:nvSpPr>
+            <p:cNvPr id="13" name="CaixaDeTexto 12">
+              <a:extLst>
+                <a:ext uri="{FF2B5EF4-FFF2-40B4-BE49-F238E27FC236}">
+                  <a16:creationId xmlns:a16="http://schemas.microsoft.com/office/drawing/2014/main" id="{5E758E81-2037-719B-5256-B88A9DD4E3DF}"/>
+                </a:ext>
+              </a:extLst>
+            </p:cNvPr>
+            <p:cNvSpPr txBox="1"/>
+            <p:nvPr/>
+          </p:nvSpPr>
+          <p:spPr>
+            <a:xfrm>
+              <a:off x="2895881" y="1101025"/>
+              <a:ext cx="619080" cy="523220"/>
+            </a:xfrm>
+            <a:prstGeom prst="rect">
+              <a:avLst/>
+            </a:prstGeom>
+            <a:noFill/>
+          </p:spPr>
+          <p:txBody>
+            <a:bodyPr wrap="none" rtlCol="0">
+              <a:spAutoFit/>
+            </a:bodyPr>
+            <a:lstStyle/>
+            <a:p>
+              <a:r>
+                <a:rPr lang="el-GR" sz="2800" dirty="0"/>
+                <a:t>Δ</a:t>
+              </a:r>
+              <a:r>
+                <a:rPr lang="pt-BR" sz="2800" dirty="0"/>
+                <a:t>N</a:t>
+              </a:r>
+            </a:p>
+          </p:txBody>
+        </p:sp>
+        <p:cxnSp>
+          <p:nvCxnSpPr>
+            <p:cNvPr id="15" name="Conector reto 14">
+              <a:extLst>
+                <a:ext uri="{FF2B5EF4-FFF2-40B4-BE49-F238E27FC236}">
+                  <a16:creationId xmlns:a16="http://schemas.microsoft.com/office/drawing/2014/main" id="{8A394189-B9E7-6EEF-C861-24BEEC02976E}"/>
+                </a:ext>
+              </a:extLst>
+            </p:cNvPr>
+            <p:cNvCxnSpPr>
+              <a:cxnSpLocks/>
+            </p:cNvCxnSpPr>
+            <p:nvPr/>
+          </p:nvCxnSpPr>
+          <p:spPr>
+            <a:xfrm flipH="1">
+              <a:off x="1068720" y="2643516"/>
+              <a:ext cx="1004047" cy="0"/>
+            </a:xfrm>
+            <a:prstGeom prst="line">
+              <a:avLst/>
+            </a:prstGeom>
+            <a:noFill/>
             <a:ln w="19050">
+              <a:solidFill>
+                <a:schemeClr val="tx1"/>
+              </a:solidFill>
+              <a:headEnd type="arrow" w="med" len="med"/>
+              <a:tailEnd type="none" w="med" len="med"/>
+            </a:ln>
+          </p:spPr>
+          <p:style>
+            <a:lnRef idx="2">
+              <a:schemeClr val="accent1">
+                <a:shade val="15000"/>
+              </a:schemeClr>
+            </a:lnRef>
+            <a:fillRef idx="1">
+              <a:schemeClr val="accent1"/>
+            </a:fillRef>
+            <a:effectRef idx="0">
+              <a:schemeClr val="accent1"/>
+            </a:effectRef>
+            <a:fontRef idx="minor">
+              <a:schemeClr val="lt1"/>
+            </a:fontRef>
+          </p:style>
+        </p:cxnSp>
+        <p:cxnSp>
+          <p:nvCxnSpPr>
+            <p:cNvPr id="17" name="Conector reto 16">
+              <a:extLst>
+                <a:ext uri="{FF2B5EF4-FFF2-40B4-BE49-F238E27FC236}">
+                  <a16:creationId xmlns:a16="http://schemas.microsoft.com/office/drawing/2014/main" id="{DF7AB916-4563-BDD8-5FB6-0220FD95FDC2}"/>
+                </a:ext>
+              </a:extLst>
+            </p:cNvPr>
+            <p:cNvCxnSpPr>
+              <a:cxnSpLocks/>
+            </p:cNvCxnSpPr>
+            <p:nvPr/>
+          </p:nvCxnSpPr>
+          <p:spPr>
+            <a:xfrm flipV="1">
+              <a:off x="1068720" y="1860750"/>
+              <a:ext cx="915234" cy="782766"/>
+            </a:xfrm>
+            <a:prstGeom prst="line">
+              <a:avLst/>
+            </a:prstGeom>
+            <a:noFill/>
+            <a:ln w="19050">
+              <a:solidFill>
+                <a:schemeClr val="tx1"/>
+              </a:solidFill>
+              <a:headEnd type="none" w="med" len="med"/>
+              <a:tailEnd type="arrow" w="med" len="med"/>
+            </a:ln>
+          </p:spPr>
+          <p:style>
+            <a:lnRef idx="2">
+              <a:schemeClr val="accent1">
+                <a:shade val="15000"/>
+              </a:schemeClr>
+            </a:lnRef>
+            <a:fillRef idx="1">
+              <a:schemeClr val="accent1"/>
+            </a:fillRef>
+            <a:effectRef idx="0">
+              <a:schemeClr val="accent1"/>
+            </a:effectRef>
+            <a:fontRef idx="minor">
+              <a:schemeClr val="lt1"/>
+            </a:fontRef>
+          </p:style>
+        </p:cxnSp>
+        <p:cxnSp>
+          <p:nvCxnSpPr>
+            <p:cNvPr id="22" name="Conector reto 21">
+              <a:extLst>
+                <a:ext uri="{FF2B5EF4-FFF2-40B4-BE49-F238E27FC236}">
+                  <a16:creationId xmlns:a16="http://schemas.microsoft.com/office/drawing/2014/main" id="{7D18DAF8-ECFD-836A-C7BE-19CB9B87890D}"/>
+                </a:ext>
+              </a:extLst>
+            </p:cNvPr>
+            <p:cNvCxnSpPr>
+              <a:cxnSpLocks/>
+            </p:cNvCxnSpPr>
+            <p:nvPr/>
+          </p:nvCxnSpPr>
+          <p:spPr>
+            <a:xfrm flipV="1">
+              <a:off x="1073891" y="2652480"/>
+              <a:ext cx="0" cy="720914"/>
+            </a:xfrm>
+            <a:prstGeom prst="line">
+              <a:avLst/>
+            </a:prstGeom>
+            <a:noFill/>
+            <a:ln w="19050">
+              <a:solidFill>
+                <a:schemeClr val="tx1"/>
+              </a:solidFill>
+              <a:headEnd type="arrow" w="med" len="med"/>
+              <a:tailEnd type="none" w="med" len="med"/>
+            </a:ln>
+          </p:spPr>
+          <p:style>
+            <a:lnRef idx="2">
+              <a:schemeClr val="accent1">
+                <a:shade val="15000"/>
+              </a:schemeClr>
+            </a:lnRef>
+            <a:fillRef idx="1">
+              <a:schemeClr val="accent1"/>
+            </a:fillRef>
+            <a:effectRef idx="0">
+              <a:schemeClr val="accent1"/>
+            </a:effectRef>
+            <a:fontRef idx="minor">
+              <a:schemeClr val="lt1"/>
+            </a:fontRef>
+          </p:style>
+        </p:cxnSp>
+        <p:sp>
+          <p:nvSpPr>
+            <p:cNvPr id="24" name="CaixaDeTexto 23">
+              <a:extLst>
+                <a:ext uri="{FF2B5EF4-FFF2-40B4-BE49-F238E27FC236}">
+                  <a16:creationId xmlns:a16="http://schemas.microsoft.com/office/drawing/2014/main" id="{51C1F51D-C02C-860F-8AF1-D5CBC8969C1C}"/>
+                </a:ext>
+              </a:extLst>
+            </p:cNvPr>
+            <p:cNvSpPr txBox="1"/>
+            <p:nvPr/>
+          </p:nvSpPr>
+          <p:spPr>
+            <a:xfrm>
+              <a:off x="1929720" y="1418790"/>
+              <a:ext cx="417102" cy="523220"/>
+            </a:xfrm>
+            <a:prstGeom prst="rect">
+              <a:avLst/>
+            </a:prstGeom>
+            <a:noFill/>
+          </p:spPr>
+          <p:txBody>
+            <a:bodyPr wrap="none" rtlCol="0">
+              <a:spAutoFit/>
+            </a:bodyPr>
+            <a:lstStyle/>
+            <a:p>
+              <a:r>
+                <a:rPr lang="pt-BR" sz="2800" dirty="0"/>
+                <a:t>N</a:t>
+              </a:r>
+            </a:p>
+          </p:txBody>
+        </p:sp>
+        <p:sp>
+          <p:nvSpPr>
+            <p:cNvPr id="25" name="CaixaDeTexto 24">
+              <a:extLst>
+                <a:ext uri="{FF2B5EF4-FFF2-40B4-BE49-F238E27FC236}">
+                  <a16:creationId xmlns:a16="http://schemas.microsoft.com/office/drawing/2014/main" id="{9F1CE0A8-4F49-7595-4680-E9788214A859}"/>
+                </a:ext>
+              </a:extLst>
+            </p:cNvPr>
+            <p:cNvSpPr txBox="1"/>
+            <p:nvPr/>
+          </p:nvSpPr>
+          <p:spPr>
+            <a:xfrm>
+              <a:off x="2084930" y="2381906"/>
+              <a:ext cx="359394" cy="523220"/>
+            </a:xfrm>
+            <a:prstGeom prst="rect">
+              <a:avLst/>
+            </a:prstGeom>
+            <a:noFill/>
+          </p:spPr>
+          <p:txBody>
+            <a:bodyPr wrap="none" rtlCol="0">
+              <a:spAutoFit/>
+            </a:bodyPr>
+            <a:lstStyle/>
+            <a:p>
+              <a:r>
+                <a:rPr lang="pt-BR" sz="2800" dirty="0"/>
+                <a:t>E</a:t>
+              </a:r>
+            </a:p>
+          </p:txBody>
+        </p:sp>
+        <p:sp>
+          <p:nvSpPr>
+            <p:cNvPr id="26" name="CaixaDeTexto 25">
+              <a:extLst>
+                <a:ext uri="{FF2B5EF4-FFF2-40B4-BE49-F238E27FC236}">
+                  <a16:creationId xmlns:a16="http://schemas.microsoft.com/office/drawing/2014/main" id="{F865F285-30B0-34A0-C501-D835F21A1C54}"/>
+                </a:ext>
+              </a:extLst>
+            </p:cNvPr>
+            <p:cNvSpPr txBox="1"/>
+            <p:nvPr/>
+          </p:nvSpPr>
+          <p:spPr>
+            <a:xfrm>
+              <a:off x="1196878" y="3111784"/>
+              <a:ext cx="388248" cy="523220"/>
+            </a:xfrm>
+            <a:prstGeom prst="rect">
+              <a:avLst/>
+            </a:prstGeom>
+            <a:noFill/>
+          </p:spPr>
+          <p:txBody>
+            <a:bodyPr wrap="none" rtlCol="0">
+              <a:spAutoFit/>
+            </a:bodyPr>
+            <a:lstStyle/>
+            <a:p>
+              <a:r>
+                <a:rPr lang="pt-BR" sz="2800" dirty="0"/>
+                <a:t>V</a:t>
+              </a:r>
+            </a:p>
+          </p:txBody>
+        </p:sp>
+        <p:sp>
+          <p:nvSpPr>
+            <p:cNvPr id="32" name="Forma Livre: Forma 31">
+              <a:extLst>
+                <a:ext uri="{FF2B5EF4-FFF2-40B4-BE49-F238E27FC236}">
+                  <a16:creationId xmlns:a16="http://schemas.microsoft.com/office/drawing/2014/main" id="{B35FEC3B-936D-A4D3-3B92-37B11BAD12B3}"/>
+                </a:ext>
+              </a:extLst>
+            </p:cNvPr>
+            <p:cNvSpPr/>
+            <p:nvPr/>
+          </p:nvSpPr>
+          <p:spPr>
+            <a:xfrm>
+              <a:off x="2819400" y="838200"/>
+              <a:ext cx="5892800" cy="1439333"/>
+            </a:xfrm>
+            <a:custGeom>
+              <a:avLst/>
+              <a:gdLst>
+                <a:gd name="connsiteX0" fmla="*/ 0 w 5892800"/>
+                <a:gd name="connsiteY0" fmla="*/ 1439333 h 1439333"/>
+                <a:gd name="connsiteX1" fmla="*/ 2286000 w 5892800"/>
+                <a:gd name="connsiteY1" fmla="*/ 457200 h 1439333"/>
+                <a:gd name="connsiteX2" fmla="*/ 5892800 w 5892800"/>
+                <a:gd name="connsiteY2" fmla="*/ 0 h 1439333"/>
+                <a:gd name="connsiteX3" fmla="*/ 5892800 w 5892800"/>
+                <a:gd name="connsiteY3" fmla="*/ 0 h 1439333"/>
+              </a:gdLst>
+              <a:ahLst/>
+              <a:cxnLst>
+                <a:cxn ang="0">
+                  <a:pos x="connsiteX0" y="connsiteY0"/>
+                </a:cxn>
+                <a:cxn ang="0">
+                  <a:pos x="connsiteX1" y="connsiteY1"/>
+                </a:cxn>
+                <a:cxn ang="0">
+                  <a:pos x="connsiteX2" y="connsiteY2"/>
+                </a:cxn>
+                <a:cxn ang="0">
+                  <a:pos x="connsiteX3" y="connsiteY3"/>
+                </a:cxn>
+              </a:cxnLst>
+              <a:rect l="l" t="t" r="r" b="b"/>
+              <a:pathLst>
+                <a:path w="5892800" h="1439333">
+                  <a:moveTo>
+                    <a:pt x="0" y="1439333"/>
+                  </a:moveTo>
+                  <a:cubicBezTo>
+                    <a:pt x="651933" y="1068211"/>
+                    <a:pt x="1303867" y="697089"/>
+                    <a:pt x="2286000" y="457200"/>
+                  </a:cubicBezTo>
+                  <a:cubicBezTo>
+                    <a:pt x="3268133" y="217311"/>
+                    <a:pt x="5892800" y="0"/>
+                    <a:pt x="5892800" y="0"/>
+                  </a:cubicBezTo>
+                  <a:lnTo>
+                    <a:pt x="5892800" y="0"/>
+                  </a:lnTo>
+                </a:path>
+              </a:pathLst>
+            </a:custGeom>
+            <a:noFill/>
+            <a:ln w="38100">
+              <a:solidFill>
+                <a:schemeClr val="tx1"/>
+              </a:solidFill>
+              <a:prstDash val="sysDash"/>
+            </a:ln>
+          </p:spPr>
+          <p:style>
+            <a:lnRef idx="2">
+              <a:schemeClr val="accent1">
+                <a:shade val="15000"/>
+              </a:schemeClr>
+            </a:lnRef>
+            <a:fillRef idx="1">
+              <a:schemeClr val="accent1"/>
+            </a:fillRef>
+            <a:effectRef idx="0">
+              <a:schemeClr val="accent1"/>
+            </a:effectRef>
+            <a:fontRef idx="minor">
+              <a:schemeClr val="lt1"/>
+            </a:fontRef>
+          </p:style>
+          <p:txBody>
+            <a:bodyPr rtlCol="0" anchor="ctr"/>
+            <a:lstStyle/>
+            <a:p>
+              <a:pPr algn="ctr"/>
+              <a:endParaRPr lang="pt-BR"/>
+            </a:p>
+          </p:txBody>
+        </p:sp>
+        <p:sp>
+          <p:nvSpPr>
+            <p:cNvPr id="33" name="Forma Livre: Forma 32">
+              <a:extLst>
+                <a:ext uri="{FF2B5EF4-FFF2-40B4-BE49-F238E27FC236}">
+                  <a16:creationId xmlns:a16="http://schemas.microsoft.com/office/drawing/2014/main" id="{7F87BB54-1D4C-0304-2E3A-9BC0DFB5494E}"/>
+                </a:ext>
+              </a:extLst>
+            </p:cNvPr>
+            <p:cNvSpPr/>
+            <p:nvPr/>
+          </p:nvSpPr>
+          <p:spPr>
+            <a:xfrm>
+              <a:off x="2802467" y="2252133"/>
+              <a:ext cx="5909733" cy="1761067"/>
+            </a:xfrm>
+            <a:custGeom>
+              <a:avLst/>
+              <a:gdLst>
+                <a:gd name="connsiteX0" fmla="*/ 0 w 5909733"/>
+                <a:gd name="connsiteY0" fmla="*/ 0 h 1761067"/>
+                <a:gd name="connsiteX1" fmla="*/ 990600 w 5909733"/>
+                <a:gd name="connsiteY1" fmla="*/ 838200 h 1761067"/>
+                <a:gd name="connsiteX2" fmla="*/ 3141133 w 5909733"/>
+                <a:gd name="connsiteY2" fmla="*/ 1354667 h 1761067"/>
+                <a:gd name="connsiteX3" fmla="*/ 5909733 w 5909733"/>
+                <a:gd name="connsiteY3" fmla="*/ 1761067 h 1761067"/>
+              </a:gdLst>
+              <a:ahLst/>
+              <a:cxnLst>
+                <a:cxn ang="0">
+                  <a:pos x="connsiteX0" y="connsiteY0"/>
+                </a:cxn>
+                <a:cxn ang="0">
+                  <a:pos x="connsiteX1" y="connsiteY1"/>
+                </a:cxn>
+                <a:cxn ang="0">
+                  <a:pos x="connsiteX2" y="connsiteY2"/>
+                </a:cxn>
+                <a:cxn ang="0">
+                  <a:pos x="connsiteX3" y="connsiteY3"/>
+                </a:cxn>
+              </a:cxnLst>
+              <a:rect l="l" t="t" r="r" b="b"/>
+              <a:pathLst>
+                <a:path w="5909733" h="1761067">
+                  <a:moveTo>
+                    <a:pt x="0" y="0"/>
+                  </a:moveTo>
+                  <a:cubicBezTo>
+                    <a:pt x="233539" y="306211"/>
+                    <a:pt x="467078" y="612422"/>
+                    <a:pt x="990600" y="838200"/>
+                  </a:cubicBezTo>
+                  <a:cubicBezTo>
+                    <a:pt x="1514122" y="1063978"/>
+                    <a:pt x="2321278" y="1200856"/>
+                    <a:pt x="3141133" y="1354667"/>
+                  </a:cubicBezTo>
+                  <a:cubicBezTo>
+                    <a:pt x="3960989" y="1508478"/>
+                    <a:pt x="4935361" y="1634772"/>
+                    <a:pt x="5909733" y="1761067"/>
+                  </a:cubicBezTo>
+                </a:path>
+              </a:pathLst>
+            </a:custGeom>
+            <a:noFill/>
+            <a:ln w="38100">
               <a:solidFill>
                 <a:schemeClr val="tx1"/>
               </a:solidFill>
@@ -5869,22 +6916,375 @@
             </a:p>
           </p:txBody>
         </p:sp>
-        <p:cxnSp>
-          <p:nvCxnSpPr>
-            <p:cNvPr id="8" name="Conector reto 7">
+        <p:sp>
+          <p:nvSpPr>
+            <p:cNvPr id="34" name="CaixaDeTexto 33">
               <a:extLst>
                 <a:ext uri="{FF2B5EF4-FFF2-40B4-BE49-F238E27FC236}">
-                  <a16:creationId xmlns:a16="http://schemas.microsoft.com/office/drawing/2014/main" id="{A8420B48-6FFA-B47C-6FC5-57A9F5708009}"/>
+                  <a16:creationId xmlns:a16="http://schemas.microsoft.com/office/drawing/2014/main" id="{E3ADAB42-24F3-5765-73DE-74581800A00E}"/>
                 </a:ext>
               </a:extLst>
             </p:cNvPr>
-            <p:cNvCxnSpPr/>
+            <p:cNvSpPr txBox="1"/>
+            <p:nvPr/>
+          </p:nvSpPr>
+          <p:spPr>
+            <a:xfrm>
+              <a:off x="3908309" y="1112980"/>
+              <a:ext cx="489236" cy="461665"/>
+            </a:xfrm>
+            <a:prstGeom prst="rect">
+              <a:avLst/>
+            </a:prstGeom>
+            <a:noFill/>
+          </p:spPr>
+          <p:txBody>
+            <a:bodyPr wrap="none" rtlCol="0">
+              <a:spAutoFit/>
+            </a:bodyPr>
+            <a:lstStyle/>
+            <a:p>
+              <a:r>
+                <a:rPr lang="el-GR" sz="2400" dirty="0"/>
+                <a:t>φ</a:t>
+              </a:r>
+              <a:r>
+                <a:rPr lang="pt-BR" sz="2400" baseline="-25000" dirty="0"/>
+                <a:t>1</a:t>
+              </a:r>
+            </a:p>
+          </p:txBody>
+        </p:sp>
+        <p:sp>
+          <p:nvSpPr>
+            <p:cNvPr id="35" name="CaixaDeTexto 34">
+              <a:extLst>
+                <a:ext uri="{FF2B5EF4-FFF2-40B4-BE49-F238E27FC236}">
+                  <a16:creationId xmlns:a16="http://schemas.microsoft.com/office/drawing/2014/main" id="{72BD8ED9-297D-67FB-4EB0-E730103DF7C2}"/>
+                </a:ext>
+              </a:extLst>
+            </p:cNvPr>
+            <p:cNvSpPr txBox="1"/>
+            <p:nvPr/>
+          </p:nvSpPr>
+          <p:spPr>
+            <a:xfrm>
+              <a:off x="2838211" y="2708145"/>
+              <a:ext cx="452368" cy="461665"/>
+            </a:xfrm>
+            <a:prstGeom prst="rect">
+              <a:avLst/>
+            </a:prstGeom>
+            <a:noFill/>
+          </p:spPr>
+          <p:txBody>
+            <a:bodyPr wrap="none" rtlCol="0">
+              <a:spAutoFit/>
+            </a:bodyPr>
+            <a:lstStyle/>
+            <a:p>
+              <a:r>
+                <a:rPr lang="el-GR" sz="2400" dirty="0"/>
+                <a:t>θ</a:t>
+              </a:r>
+              <a:r>
+                <a:rPr lang="pt-BR" sz="2400" baseline="-25000" dirty="0"/>
+                <a:t>1</a:t>
+              </a:r>
+            </a:p>
+          </p:txBody>
+        </p:sp>
+        <p:sp>
+          <p:nvSpPr>
+            <p:cNvPr id="36" name="CaixaDeTexto 35">
+              <a:extLst>
+                <a:ext uri="{FF2B5EF4-FFF2-40B4-BE49-F238E27FC236}">
+                  <a16:creationId xmlns:a16="http://schemas.microsoft.com/office/drawing/2014/main" id="{11CCAF5E-0DD5-B88C-1406-943D72EFD8F7}"/>
+                </a:ext>
+              </a:extLst>
+            </p:cNvPr>
+            <p:cNvSpPr txBox="1"/>
+            <p:nvPr/>
+          </p:nvSpPr>
+          <p:spPr>
+            <a:xfrm>
+              <a:off x="9262373" y="203957"/>
+              <a:ext cx="489236" cy="461665"/>
+            </a:xfrm>
+            <a:prstGeom prst="rect">
+              <a:avLst/>
+            </a:prstGeom>
+            <a:noFill/>
+          </p:spPr>
+          <p:txBody>
+            <a:bodyPr wrap="none" rtlCol="0">
+              <a:spAutoFit/>
+            </a:bodyPr>
+            <a:lstStyle/>
+            <a:p>
+              <a:r>
+                <a:rPr lang="el-GR" sz="2400" dirty="0"/>
+                <a:t>φ</a:t>
+              </a:r>
+              <a:r>
+                <a:rPr lang="pt-BR" sz="2400" baseline="-25000" dirty="0"/>
+                <a:t>2</a:t>
+              </a:r>
+            </a:p>
+          </p:txBody>
+        </p:sp>
+        <p:sp>
+          <p:nvSpPr>
+            <p:cNvPr id="37" name="CaixaDeTexto 36">
+              <a:extLst>
+                <a:ext uri="{FF2B5EF4-FFF2-40B4-BE49-F238E27FC236}">
+                  <a16:creationId xmlns:a16="http://schemas.microsoft.com/office/drawing/2014/main" id="{85D033D1-057A-127F-67C0-D4A5EB37D190}"/>
+                </a:ext>
+              </a:extLst>
+            </p:cNvPr>
+            <p:cNvSpPr txBox="1"/>
+            <p:nvPr/>
+          </p:nvSpPr>
+          <p:spPr>
+            <a:xfrm>
+              <a:off x="8870866" y="4161602"/>
+              <a:ext cx="452368" cy="461665"/>
+            </a:xfrm>
+            <a:prstGeom prst="rect">
+              <a:avLst/>
+            </a:prstGeom>
+            <a:noFill/>
+          </p:spPr>
+          <p:txBody>
+            <a:bodyPr wrap="none" rtlCol="0">
+              <a:spAutoFit/>
+            </a:bodyPr>
+            <a:lstStyle/>
+            <a:p>
+              <a:r>
+                <a:rPr lang="el-GR" sz="2400" dirty="0"/>
+                <a:t>θ</a:t>
+              </a:r>
+              <a:r>
+                <a:rPr lang="pt-BR" sz="2400" baseline="-25000" dirty="0"/>
+                <a:t>2</a:t>
+              </a:r>
+            </a:p>
+          </p:txBody>
+        </p:sp>
+        <p:sp>
+          <p:nvSpPr>
+            <p:cNvPr id="38" name="CaixaDeTexto 37">
+              <a:extLst>
+                <a:ext uri="{FF2B5EF4-FFF2-40B4-BE49-F238E27FC236}">
+                  <a16:creationId xmlns:a16="http://schemas.microsoft.com/office/drawing/2014/main" id="{00301B9B-F6A5-9E67-50AC-6977DCEB4F14}"/>
+                </a:ext>
+              </a:extLst>
+            </p:cNvPr>
+            <p:cNvSpPr txBox="1"/>
+            <p:nvPr/>
+          </p:nvSpPr>
+          <p:spPr>
+            <a:xfrm>
+              <a:off x="5205579" y="3020611"/>
+              <a:ext cx="551754" cy="523220"/>
+            </a:xfrm>
+            <a:prstGeom prst="rect">
+              <a:avLst/>
+            </a:prstGeom>
+            <a:noFill/>
+          </p:spPr>
+          <p:txBody>
+            <a:bodyPr wrap="none" rtlCol="0">
+              <a:spAutoFit/>
+            </a:bodyPr>
+            <a:lstStyle/>
+            <a:p>
+              <a:r>
+                <a:rPr lang="el-GR" sz="2800" dirty="0"/>
+                <a:t>Δ</a:t>
+              </a:r>
+              <a:r>
+                <a:rPr lang="pt-BR" sz="2800" dirty="0"/>
+                <a:t>S</a:t>
+              </a:r>
+            </a:p>
+          </p:txBody>
+        </p:sp>
+        <p:sp>
+          <p:nvSpPr>
+            <p:cNvPr id="39" name="Arco 38">
+              <a:extLst>
+                <a:ext uri="{FF2B5EF4-FFF2-40B4-BE49-F238E27FC236}">
+                  <a16:creationId xmlns:a16="http://schemas.microsoft.com/office/drawing/2014/main" id="{11F8EFB1-8AAE-A573-15FA-31E0FD450D7F}"/>
+                </a:ext>
+              </a:extLst>
+            </p:cNvPr>
+            <p:cNvSpPr/>
+            <p:nvPr/>
+          </p:nvSpPr>
+          <p:spPr>
+            <a:xfrm rot="5650816">
+              <a:off x="2491747" y="2036753"/>
+              <a:ext cx="722845" cy="756119"/>
+            </a:xfrm>
+            <a:prstGeom prst="arc">
+              <a:avLst>
+                <a:gd name="adj1" fmla="val 18422488"/>
+                <a:gd name="adj2" fmla="val 0"/>
+              </a:avLst>
+            </a:prstGeom>
+            <a:ln w="12700">
+              <a:solidFill>
+                <a:schemeClr val="tx1"/>
+              </a:solidFill>
+            </a:ln>
+          </p:spPr>
+          <p:style>
+            <a:lnRef idx="1">
+              <a:schemeClr val="accent1"/>
+            </a:lnRef>
+            <a:fillRef idx="0">
+              <a:schemeClr val="accent1"/>
+            </a:fillRef>
+            <a:effectRef idx="0">
+              <a:schemeClr val="accent1"/>
+            </a:effectRef>
+            <a:fontRef idx="minor">
+              <a:schemeClr val="tx1"/>
+            </a:fontRef>
+          </p:style>
+          <p:txBody>
+            <a:bodyPr rtlCol="0" anchor="ctr"/>
+            <a:lstStyle/>
+            <a:p>
+              <a:pPr algn="ctr"/>
+              <a:endParaRPr lang="pt-BR"/>
+            </a:p>
+          </p:txBody>
+        </p:sp>
+        <p:sp>
+          <p:nvSpPr>
+            <p:cNvPr id="40" name="Arco 39">
+              <a:extLst>
+                <a:ext uri="{FF2B5EF4-FFF2-40B4-BE49-F238E27FC236}">
+                  <a16:creationId xmlns:a16="http://schemas.microsoft.com/office/drawing/2014/main" id="{0E23E099-535B-BFD8-6AB7-2B33705077D5}"/>
+                </a:ext>
+              </a:extLst>
+            </p:cNvPr>
+            <p:cNvSpPr/>
+            <p:nvPr/>
+          </p:nvSpPr>
+          <p:spPr>
+            <a:xfrm rot="19925123">
+              <a:off x="3387170" y="1430640"/>
+              <a:ext cx="722845" cy="756119"/>
+            </a:xfrm>
+            <a:prstGeom prst="arc">
+              <a:avLst>
+                <a:gd name="adj1" fmla="val 18422488"/>
+                <a:gd name="adj2" fmla="val 0"/>
+              </a:avLst>
+            </a:prstGeom>
+            <a:ln w="12700">
+              <a:solidFill>
+                <a:schemeClr val="tx1"/>
+              </a:solidFill>
+            </a:ln>
+          </p:spPr>
+          <p:style>
+            <a:lnRef idx="1">
+              <a:schemeClr val="accent1"/>
+            </a:lnRef>
+            <a:fillRef idx="0">
+              <a:schemeClr val="accent1"/>
+            </a:fillRef>
+            <a:effectRef idx="0">
+              <a:schemeClr val="accent1"/>
+            </a:effectRef>
+            <a:fontRef idx="minor">
+              <a:schemeClr val="tx1"/>
+            </a:fontRef>
+          </p:style>
+          <p:txBody>
+            <a:bodyPr rtlCol="0" anchor="ctr"/>
+            <a:lstStyle/>
+            <a:p>
+              <a:pPr algn="ctr"/>
+              <a:endParaRPr lang="pt-BR"/>
+            </a:p>
+          </p:txBody>
+        </p:sp>
+        <p:sp>
+          <p:nvSpPr>
+            <p:cNvPr id="41" name="Arco 40">
+              <a:extLst>
+                <a:ext uri="{FF2B5EF4-FFF2-40B4-BE49-F238E27FC236}">
+                  <a16:creationId xmlns:a16="http://schemas.microsoft.com/office/drawing/2014/main" id="{EA46B7CC-FD49-EDE6-0E90-E590E23F3F4B}"/>
+                </a:ext>
+              </a:extLst>
+            </p:cNvPr>
+            <p:cNvSpPr/>
+            <p:nvPr/>
+          </p:nvSpPr>
+          <p:spPr>
+            <a:xfrm rot="19925123">
+              <a:off x="8544950" y="590781"/>
+              <a:ext cx="722845" cy="756119"/>
+            </a:xfrm>
+            <a:prstGeom prst="arc">
+              <a:avLst>
+                <a:gd name="adj1" fmla="val 18422488"/>
+                <a:gd name="adj2" fmla="val 21381862"/>
+              </a:avLst>
+            </a:prstGeom>
+            <a:ln w="12700">
+              <a:solidFill>
+                <a:schemeClr val="tx1"/>
+              </a:solidFill>
+            </a:ln>
+          </p:spPr>
+          <p:style>
+            <a:lnRef idx="1">
+              <a:schemeClr val="accent1"/>
+            </a:lnRef>
+            <a:fillRef idx="0">
+              <a:schemeClr val="accent1"/>
+            </a:fillRef>
+            <a:effectRef idx="0">
+              <a:schemeClr val="accent1"/>
+            </a:effectRef>
+            <a:fontRef idx="minor">
+              <a:schemeClr val="tx1"/>
+            </a:fontRef>
+          </p:style>
+          <p:txBody>
+            <a:bodyPr rtlCol="0" anchor="ctr"/>
+            <a:lstStyle/>
+            <a:p>
+              <a:pPr algn="ctr"/>
+              <a:endParaRPr lang="pt-BR"/>
+            </a:p>
+          </p:txBody>
+        </p:sp>
+        <p:cxnSp>
+          <p:nvCxnSpPr>
+            <p:cNvPr id="42" name="Conector reto 41">
+              <a:extLst>
+                <a:ext uri="{FF2B5EF4-FFF2-40B4-BE49-F238E27FC236}">
+                  <a16:creationId xmlns:a16="http://schemas.microsoft.com/office/drawing/2014/main" id="{A974A345-79C6-BC6A-3402-496C38E270F6}"/>
+                </a:ext>
+              </a:extLst>
+            </p:cNvPr>
+            <p:cNvCxnSpPr>
+              <a:cxnSpLocks/>
+            </p:cNvCxnSpPr>
             <p:nvPr/>
           </p:nvCxnSpPr>
           <p:spPr>
             <a:xfrm flipV="1">
-              <a:off x="2823882" y="820270"/>
-              <a:ext cx="1703294" cy="1456765"/>
+              <a:off x="8736106" y="483495"/>
+              <a:ext cx="372637" cy="318703"/>
             </a:xfrm>
             <a:prstGeom prst="line">
               <a:avLst/>
@@ -5894,6 +7294,8 @@
               <a:solidFill>
                 <a:schemeClr val="tx1"/>
               </a:solidFill>
+              <a:headEnd type="none" w="med" len="med"/>
+              <a:tailEnd type="none" w="med" len="med"/>
             </a:ln>
           </p:spPr>
           <p:style>
@@ -5915,10 +7317,10 @@
         </p:cxnSp>
         <p:cxnSp>
           <p:nvCxnSpPr>
-            <p:cNvPr id="9" name="Conector reto 8">
+            <p:cNvPr id="44" name="Conector reto 43">
               <a:extLst>
                 <a:ext uri="{FF2B5EF4-FFF2-40B4-BE49-F238E27FC236}">
-                  <a16:creationId xmlns:a16="http://schemas.microsoft.com/office/drawing/2014/main" id="{55C465CB-9276-4EDE-695B-8EA199064A40}"/>
+                  <a16:creationId xmlns:a16="http://schemas.microsoft.com/office/drawing/2014/main" id="{605988CF-1A8E-F52B-5882-49F04B519788}"/>
                 </a:ext>
               </a:extLst>
             </p:cNvPr>
@@ -5927,8 +7329,8 @@
           </p:nvCxnSpPr>
           <p:spPr>
             <a:xfrm flipV="1">
-              <a:off x="7037294" y="820270"/>
-              <a:ext cx="1703294" cy="1456765"/>
+              <a:off x="8740588" y="744071"/>
+              <a:ext cx="1062318" cy="76199"/>
             </a:xfrm>
             <a:prstGeom prst="line">
               <a:avLst/>
@@ -5938,6 +7340,109 @@
               <a:solidFill>
                 <a:schemeClr val="tx1"/>
               </a:solidFill>
+              <a:prstDash val="sysDash"/>
+              <a:headEnd type="none" w="med" len="med"/>
+              <a:tailEnd type="none" w="med" len="med"/>
+            </a:ln>
+          </p:spPr>
+          <p:style>
+            <a:lnRef idx="2">
+              <a:schemeClr val="accent1">
+                <a:shade val="15000"/>
+              </a:schemeClr>
+            </a:lnRef>
+            <a:fillRef idx="1">
+              <a:schemeClr val="accent1"/>
+            </a:fillRef>
+            <a:effectRef idx="0">
+              <a:schemeClr val="accent1"/>
+            </a:effectRef>
+            <a:fontRef idx="minor">
+              <a:schemeClr val="lt1"/>
+            </a:fontRef>
+          </p:style>
+        </p:cxnSp>
+        <p:sp>
+          <p:nvSpPr>
+            <p:cNvPr id="46" name="Arco 45">
+              <a:extLst>
+                <a:ext uri="{FF2B5EF4-FFF2-40B4-BE49-F238E27FC236}">
+                  <a16:creationId xmlns:a16="http://schemas.microsoft.com/office/drawing/2014/main" id="{3E9C81EA-372F-F3EC-2FB7-A4322DD8CC46}"/>
+                </a:ext>
+              </a:extLst>
+            </p:cNvPr>
+            <p:cNvSpPr/>
+            <p:nvPr/>
+          </p:nvSpPr>
+          <p:spPr>
+            <a:xfrm rot="5638934">
+              <a:off x="8379166" y="3473419"/>
+              <a:ext cx="722845" cy="756119"/>
+            </a:xfrm>
+            <a:prstGeom prst="arc">
+              <a:avLst>
+                <a:gd name="adj1" fmla="val 18422488"/>
+                <a:gd name="adj2" fmla="val 21381862"/>
+              </a:avLst>
+            </a:prstGeom>
+            <a:ln w="12700">
+              <a:solidFill>
+                <a:schemeClr val="tx1"/>
+              </a:solidFill>
+            </a:ln>
+          </p:spPr>
+          <p:style>
+            <a:lnRef idx="1">
+              <a:schemeClr val="accent1"/>
+            </a:lnRef>
+            <a:fillRef idx="0">
+              <a:schemeClr val="accent1"/>
+            </a:fillRef>
+            <a:effectRef idx="0">
+              <a:schemeClr val="accent1"/>
+            </a:effectRef>
+            <a:fontRef idx="minor">
+              <a:schemeClr val="tx1"/>
+            </a:fontRef>
+          </p:style>
+          <p:txBody>
+            <a:bodyPr rtlCol="0" anchor="ctr"/>
+            <a:lstStyle/>
+            <a:p>
+              <a:pPr algn="ctr"/>
+              <a:endParaRPr lang="pt-BR"/>
+            </a:p>
+          </p:txBody>
+        </p:sp>
+        <p:cxnSp>
+          <p:nvCxnSpPr>
+            <p:cNvPr id="47" name="Conector reto 46">
+              <a:extLst>
+                <a:ext uri="{FF2B5EF4-FFF2-40B4-BE49-F238E27FC236}">
+                  <a16:creationId xmlns:a16="http://schemas.microsoft.com/office/drawing/2014/main" id="{427E2D03-3639-167A-6F2F-5CE28C36F15D}"/>
+                </a:ext>
+              </a:extLst>
+            </p:cNvPr>
+            <p:cNvCxnSpPr>
+              <a:cxnSpLocks/>
+            </p:cNvCxnSpPr>
+            <p:nvPr/>
+          </p:nvCxnSpPr>
+          <p:spPr>
+            <a:xfrm>
+              <a:off x="8742138" y="4048944"/>
+              <a:ext cx="4482" cy="569032"/>
+            </a:xfrm>
+            <a:prstGeom prst="line">
+              <a:avLst/>
+            </a:prstGeom>
+            <a:noFill/>
+            <a:ln w="19050">
+              <a:solidFill>
+                <a:schemeClr val="tx1"/>
+              </a:solidFill>
+              <a:headEnd type="none" w="med" len="med"/>
+              <a:tailEnd type="none" w="med" len="med"/>
             </a:ln>
           </p:spPr>
           <p:style>
@@ -5959,20 +7464,22 @@
         </p:cxnSp>
         <p:cxnSp>
           <p:nvCxnSpPr>
-            <p:cNvPr id="10" name="Conector reto 9">
+            <p:cNvPr id="48" name="Conector reto 47">
               <a:extLst>
                 <a:ext uri="{FF2B5EF4-FFF2-40B4-BE49-F238E27FC236}">
-                  <a16:creationId xmlns:a16="http://schemas.microsoft.com/office/drawing/2014/main" id="{32746068-F31F-DAD6-1739-65DA727743AE}"/>
+                  <a16:creationId xmlns:a16="http://schemas.microsoft.com/office/drawing/2014/main" id="{37A1ABE0-F393-2A50-202B-931BE9847F93}"/>
                 </a:ext>
               </a:extLst>
             </p:cNvPr>
-            <p:cNvCxnSpPr/>
+            <p:cNvCxnSpPr>
+              <a:cxnSpLocks/>
+            </p:cNvCxnSpPr>
             <p:nvPr/>
           </p:nvCxnSpPr>
           <p:spPr>
-            <a:xfrm flipV="1">
-              <a:off x="7037294" y="4038600"/>
-              <a:ext cx="1703294" cy="1456765"/>
+            <a:xfrm>
+              <a:off x="8771246" y="4036290"/>
+              <a:ext cx="1109354" cy="250624"/>
             </a:xfrm>
             <a:prstGeom prst="line">
               <a:avLst/>
@@ -5982,6 +7489,9 @@
               <a:solidFill>
                 <a:schemeClr val="tx1"/>
               </a:solidFill>
+              <a:prstDash val="sysDash"/>
+              <a:headEnd type="none" w="med" len="med"/>
+              <a:tailEnd type="none" w="med" len="med"/>
             </a:ln>
           </p:spPr>
           <p:style>
@@ -6003,10 +7513,289 @@
         </p:cxnSp>
         <p:cxnSp>
           <p:nvCxnSpPr>
-            <p:cNvPr id="11" name="Conector reto 10">
+            <p:cNvPr id="18" name="Conector reto 17">
               <a:extLst>
                 <a:ext uri="{FF2B5EF4-FFF2-40B4-BE49-F238E27FC236}">
-                  <a16:creationId xmlns:a16="http://schemas.microsoft.com/office/drawing/2014/main" id="{6289377A-18D2-23DF-A975-92DD5BE0BE31}"/>
+                  <a16:creationId xmlns:a16="http://schemas.microsoft.com/office/drawing/2014/main" id="{0DBA9DED-B487-6EDB-9BA6-3E66AC56D71F}"/>
+                </a:ext>
+              </a:extLst>
+            </p:cNvPr>
+            <p:cNvCxnSpPr>
+              <a:cxnSpLocks/>
+              <a:stCxn id="33" idx="0"/>
+            </p:cNvCxnSpPr>
+            <p:nvPr/>
+          </p:nvCxnSpPr>
+          <p:spPr>
+            <a:xfrm>
+              <a:off x="2802467" y="2252133"/>
+              <a:ext cx="1105842" cy="1382871"/>
+            </a:xfrm>
+            <a:prstGeom prst="line">
+              <a:avLst/>
+            </a:prstGeom>
+            <a:ln>
+              <a:solidFill>
+                <a:schemeClr val="tx1"/>
+              </a:solidFill>
+            </a:ln>
+          </p:spPr>
+          <p:style>
+            <a:lnRef idx="1">
+              <a:schemeClr val="accent1"/>
+            </a:lnRef>
+            <a:fillRef idx="0">
+              <a:schemeClr val="accent1"/>
+            </a:fillRef>
+            <a:effectRef idx="0">
+              <a:schemeClr val="accent1"/>
+            </a:effectRef>
+            <a:fontRef idx="minor">
+              <a:schemeClr val="tx1"/>
+            </a:fontRef>
+          </p:style>
+        </p:cxnSp>
+        <p:cxnSp>
+          <p:nvCxnSpPr>
+            <p:cNvPr id="19" name="Conector reto 18">
+              <a:extLst>
+                <a:ext uri="{FF2B5EF4-FFF2-40B4-BE49-F238E27FC236}">
+                  <a16:creationId xmlns:a16="http://schemas.microsoft.com/office/drawing/2014/main" id="{B695E7B5-659F-A295-CFF2-4B4330661624}"/>
+                </a:ext>
+              </a:extLst>
+            </p:cNvPr>
+            <p:cNvCxnSpPr>
+              <a:cxnSpLocks/>
+              <a:endCxn id="4" idx="6"/>
+            </p:cNvCxnSpPr>
+            <p:nvPr/>
+          </p:nvCxnSpPr>
+          <p:spPr>
+            <a:xfrm>
+              <a:off x="3252232" y="3322320"/>
+              <a:ext cx="5560356" cy="713589"/>
+            </a:xfrm>
+            <a:prstGeom prst="line">
+              <a:avLst/>
+            </a:prstGeom>
+            <a:ln>
+              <a:solidFill>
+                <a:schemeClr val="tx1"/>
+              </a:solidFill>
+            </a:ln>
+          </p:spPr>
+          <p:style>
+            <a:lnRef idx="1">
+              <a:schemeClr val="accent1"/>
+            </a:lnRef>
+            <a:fillRef idx="0">
+              <a:schemeClr val="accent1"/>
+            </a:fillRef>
+            <a:effectRef idx="0">
+              <a:schemeClr val="accent1"/>
+            </a:effectRef>
+            <a:fontRef idx="minor">
+              <a:schemeClr val="tx1"/>
+            </a:fontRef>
+          </p:style>
+        </p:cxnSp>
+        <p:sp>
+          <p:nvSpPr>
+            <p:cNvPr id="31" name="Arco 30">
+              <a:extLst>
+                <a:ext uri="{FF2B5EF4-FFF2-40B4-BE49-F238E27FC236}">
+                  <a16:creationId xmlns:a16="http://schemas.microsoft.com/office/drawing/2014/main" id="{90658202-2F01-1604-381B-6A0FE7788BD7}"/>
+                </a:ext>
+              </a:extLst>
+            </p:cNvPr>
+            <p:cNvSpPr/>
+            <p:nvPr/>
+          </p:nvSpPr>
+          <p:spPr>
+            <a:xfrm rot="5650816">
+              <a:off x="3449155" y="2791750"/>
+              <a:ext cx="722845" cy="756119"/>
+            </a:xfrm>
+            <a:prstGeom prst="arc">
+              <a:avLst>
+                <a:gd name="adj1" fmla="val 18621081"/>
+                <a:gd name="adj2" fmla="val 21186465"/>
+              </a:avLst>
+            </a:prstGeom>
+            <a:ln w="12700">
+              <a:solidFill>
+                <a:schemeClr val="tx1"/>
+              </a:solidFill>
+            </a:ln>
+          </p:spPr>
+          <p:style>
+            <a:lnRef idx="1">
+              <a:schemeClr val="accent1"/>
+            </a:lnRef>
+            <a:fillRef idx="0">
+              <a:schemeClr val="accent1"/>
+            </a:fillRef>
+            <a:effectRef idx="0">
+              <a:schemeClr val="accent1"/>
+            </a:effectRef>
+            <a:fontRef idx="minor">
+              <a:schemeClr val="tx1"/>
+            </a:fontRef>
+          </p:style>
+          <p:txBody>
+            <a:bodyPr rtlCol="0" anchor="ctr"/>
+            <a:lstStyle/>
+            <a:p>
+              <a:pPr algn="ctr"/>
+              <a:endParaRPr lang="pt-BR"/>
+            </a:p>
+          </p:txBody>
+        </p:sp>
+        <p:sp>
+          <p:nvSpPr>
+            <p:cNvPr id="43" name="CaixaDeTexto 42">
+              <a:extLst>
+                <a:ext uri="{FF2B5EF4-FFF2-40B4-BE49-F238E27FC236}">
+                  <a16:creationId xmlns:a16="http://schemas.microsoft.com/office/drawing/2014/main" id="{565D442E-EA61-3E70-E82A-78B030922B70}"/>
+                </a:ext>
+              </a:extLst>
+            </p:cNvPr>
+            <p:cNvSpPr txBox="1"/>
+            <p:nvPr/>
+          </p:nvSpPr>
+          <p:spPr>
+            <a:xfrm>
+              <a:off x="3912791" y="3338793"/>
+              <a:ext cx="359394" cy="461665"/>
+            </a:xfrm>
+            <a:prstGeom prst="rect">
+              <a:avLst/>
+            </a:prstGeom>
+            <a:noFill/>
+          </p:spPr>
+          <p:txBody>
+            <a:bodyPr wrap="none" rtlCol="0">
+              <a:spAutoFit/>
+            </a:bodyPr>
+            <a:lstStyle/>
+            <a:p>
+              <a:r>
+                <a:rPr lang="el-GR" sz="2400" dirty="0"/>
+                <a:t>α</a:t>
+              </a:r>
+              <a:endParaRPr lang="pt-BR" sz="2400" dirty="0"/>
+            </a:p>
+          </p:txBody>
+        </p:sp>
+      </p:grpSp>
+    </p:spTree>
+    <p:extLst>
+      <p:ext uri="{BB962C8B-B14F-4D97-AF65-F5344CB8AC3E}">
+        <p14:creationId xmlns:p14="http://schemas.microsoft.com/office/powerpoint/2010/main" val="3395447863"/>
+      </p:ext>
+    </p:extLst>
+  </p:cSld>
+  <p:clrMapOvr>
+    <a:masterClrMapping/>
+  </p:clrMapOvr>
+</p:sld>
+</file>
+
+<file path=ppt/slides/slide5.xml><?xml version="1.0" encoding="utf-8"?>
+<p:sld xmlns:a="http://schemas.openxmlformats.org/drawingml/2006/main" xmlns:r="http://schemas.openxmlformats.org/officeDocument/2006/relationships" xmlns:p="http://schemas.openxmlformats.org/presentationml/2006/main">
+  <p:cSld>
+    <p:spTree>
+      <p:nvGrpSpPr>
+        <p:cNvPr id="1" name=""/>
+        <p:cNvGrpSpPr/>
+        <p:nvPr/>
+      </p:nvGrpSpPr>
+      <p:grpSpPr>
+        <a:xfrm>
+          <a:off x="0" y="0"/>
+          <a:ext cx="0" cy="0"/>
+          <a:chOff x="0" y="0"/>
+          <a:chExt cx="0" cy="0"/>
+        </a:xfrm>
+      </p:grpSpPr>
+      <p:grpSp>
+        <p:nvGrpSpPr>
+          <p:cNvPr id="48" name="Agrupar 47">
+            <a:extLst>
+              <a:ext uri="{FF2B5EF4-FFF2-40B4-BE49-F238E27FC236}">
+                <a16:creationId xmlns:a16="http://schemas.microsoft.com/office/drawing/2014/main" id="{90727FEE-865E-1B6B-27DF-32BDE65497DD}"/>
+              </a:ext>
+            </a:extLst>
+          </p:cNvPr>
+          <p:cNvGrpSpPr/>
+          <p:nvPr/>
+        </p:nvGrpSpPr>
+        <p:grpSpPr>
+          <a:xfrm>
+            <a:off x="-696277" y="342900"/>
+            <a:ext cx="4935528" cy="6725189"/>
+            <a:chOff x="-696277" y="342900"/>
+            <a:chExt cx="4935528" cy="6725189"/>
+          </a:xfrm>
+        </p:grpSpPr>
+        <p:sp>
+          <p:nvSpPr>
+            <p:cNvPr id="9" name="Arco 8">
+              <a:extLst>
+                <a:ext uri="{FF2B5EF4-FFF2-40B4-BE49-F238E27FC236}">
+                  <a16:creationId xmlns:a16="http://schemas.microsoft.com/office/drawing/2014/main" id="{0C046553-8B1C-91F3-F54D-0D1E5E43F9B4}"/>
+                </a:ext>
+              </a:extLst>
+            </p:cNvPr>
+            <p:cNvSpPr/>
+            <p:nvPr/>
+          </p:nvSpPr>
+          <p:spPr>
+            <a:xfrm>
+              <a:off x="-696277" y="2748089"/>
+              <a:ext cx="4320000" cy="4320000"/>
+            </a:xfrm>
+            <a:prstGeom prst="arc">
+              <a:avLst>
+                <a:gd name="adj1" fmla="val 19420495"/>
+                <a:gd name="adj2" fmla="val 0"/>
+              </a:avLst>
+            </a:prstGeom>
+            <a:ln w="19050">
+              <a:solidFill>
+                <a:schemeClr val="tx1"/>
+              </a:solidFill>
+            </a:ln>
+          </p:spPr>
+          <p:style>
+            <a:lnRef idx="1">
+              <a:schemeClr val="accent1"/>
+            </a:lnRef>
+            <a:fillRef idx="0">
+              <a:schemeClr val="accent1"/>
+            </a:fillRef>
+            <a:effectRef idx="0">
+              <a:schemeClr val="accent1"/>
+            </a:effectRef>
+            <a:fontRef idx="minor">
+              <a:schemeClr val="tx1"/>
+            </a:fontRef>
+          </p:style>
+          <p:txBody>
+            <a:bodyPr rtlCol="0" anchor="ctr"/>
+            <a:lstStyle/>
+            <a:p>
+              <a:pPr algn="ctr"/>
+              <a:endParaRPr lang="pt-BR" dirty="0"/>
+            </a:p>
+          </p:txBody>
+        </p:sp>
+        <p:cxnSp>
+          <p:nvCxnSpPr>
+            <p:cNvPr id="3" name="Conector reto 2">
+              <a:extLst>
+                <a:ext uri="{FF2B5EF4-FFF2-40B4-BE49-F238E27FC236}">
+                  <a16:creationId xmlns:a16="http://schemas.microsoft.com/office/drawing/2014/main" id="{BDF7955A-3748-F602-528E-C1B6C0C6AB7E}"/>
                 </a:ext>
               </a:extLst>
             </p:cNvPr>
@@ -6014,9 +7803,464 @@
             <p:nvPr/>
           </p:nvCxnSpPr>
           <p:spPr>
-            <a:xfrm flipV="1">
-              <a:off x="2823882" y="4038599"/>
-              <a:ext cx="1703294" cy="1456765"/>
+            <a:xfrm>
+              <a:off x="2079812" y="394447"/>
+              <a:ext cx="0" cy="1272988"/>
+            </a:xfrm>
+            <a:prstGeom prst="line">
+              <a:avLst/>
+            </a:prstGeom>
+            <a:ln w="19050">
+              <a:solidFill>
+                <a:schemeClr val="tx1"/>
+              </a:solidFill>
+            </a:ln>
+          </p:spPr>
+          <p:style>
+            <a:lnRef idx="1">
+              <a:schemeClr val="accent1"/>
+            </a:lnRef>
+            <a:fillRef idx="0">
+              <a:schemeClr val="accent1"/>
+            </a:fillRef>
+            <a:effectRef idx="0">
+              <a:schemeClr val="accent1"/>
+            </a:effectRef>
+            <a:fontRef idx="minor">
+              <a:schemeClr val="tx1"/>
+            </a:fontRef>
+          </p:style>
+        </p:cxnSp>
+        <p:sp>
+          <p:nvSpPr>
+            <p:cNvPr id="6" name="Arco 5">
+              <a:extLst>
+                <a:ext uri="{FF2B5EF4-FFF2-40B4-BE49-F238E27FC236}">
+                  <a16:creationId xmlns:a16="http://schemas.microsoft.com/office/drawing/2014/main" id="{DDA38D4C-0E60-9854-ADA3-8529D35BEB41}"/>
+                </a:ext>
+              </a:extLst>
+            </p:cNvPr>
+            <p:cNvSpPr/>
+            <p:nvPr/>
+          </p:nvSpPr>
+          <p:spPr>
+            <a:xfrm rot="10800000">
+              <a:off x="2079251" y="586780"/>
+              <a:ext cx="2160000" cy="2161309"/>
+            </a:xfrm>
+            <a:prstGeom prst="arc">
+              <a:avLst>
+                <a:gd name="adj1" fmla="val 19420495"/>
+                <a:gd name="adj2" fmla="val 0"/>
+              </a:avLst>
+            </a:prstGeom>
+            <a:ln w="19050">
+              <a:solidFill>
+                <a:schemeClr val="tx1"/>
+              </a:solidFill>
+            </a:ln>
+          </p:spPr>
+          <p:style>
+            <a:lnRef idx="1">
+              <a:schemeClr val="accent1"/>
+            </a:lnRef>
+            <a:fillRef idx="0">
+              <a:schemeClr val="accent1"/>
+            </a:fillRef>
+            <a:effectRef idx="0">
+              <a:schemeClr val="accent1"/>
+            </a:effectRef>
+            <a:fontRef idx="minor">
+              <a:schemeClr val="tx1"/>
+            </a:fontRef>
+          </p:style>
+          <p:txBody>
+            <a:bodyPr rtlCol="0" anchor="ctr"/>
+            <a:lstStyle/>
+            <a:p>
+              <a:pPr algn="ctr"/>
+              <a:endParaRPr lang="pt-BR"/>
+            </a:p>
+          </p:txBody>
+        </p:sp>
+        <p:cxnSp>
+          <p:nvCxnSpPr>
+            <p:cNvPr id="7" name="Conector reto 6">
+              <a:extLst>
+                <a:ext uri="{FF2B5EF4-FFF2-40B4-BE49-F238E27FC236}">
+                  <a16:creationId xmlns:a16="http://schemas.microsoft.com/office/drawing/2014/main" id="{8ED46EDB-9788-480C-2657-72F34F9456A9}"/>
+                </a:ext>
+              </a:extLst>
+            </p:cNvPr>
+            <p:cNvCxnSpPr>
+              <a:cxnSpLocks/>
+            </p:cNvCxnSpPr>
+            <p:nvPr/>
+          </p:nvCxnSpPr>
+          <p:spPr>
+            <a:xfrm>
+              <a:off x="2280980" y="2296399"/>
+              <a:ext cx="949900" cy="1367297"/>
+            </a:xfrm>
+            <a:prstGeom prst="line">
+              <a:avLst/>
+            </a:prstGeom>
+            <a:ln w="19050">
+              <a:solidFill>
+                <a:schemeClr val="tx1"/>
+              </a:solidFill>
+            </a:ln>
+          </p:spPr>
+          <p:style>
+            <a:lnRef idx="1">
+              <a:schemeClr val="accent1"/>
+            </a:lnRef>
+            <a:fillRef idx="0">
+              <a:schemeClr val="accent1"/>
+            </a:fillRef>
+            <a:effectRef idx="0">
+              <a:schemeClr val="accent1"/>
+            </a:effectRef>
+            <a:fontRef idx="minor">
+              <a:schemeClr val="tx1"/>
+            </a:fontRef>
+          </p:style>
+        </p:cxnSp>
+        <p:cxnSp>
+          <p:nvCxnSpPr>
+            <p:cNvPr id="10" name="Conector reto 9">
+              <a:extLst>
+                <a:ext uri="{FF2B5EF4-FFF2-40B4-BE49-F238E27FC236}">
+                  <a16:creationId xmlns:a16="http://schemas.microsoft.com/office/drawing/2014/main" id="{3EA0D15B-BF3E-BEBB-2BB2-3BBDD9E7DB88}"/>
+                </a:ext>
+              </a:extLst>
+            </p:cNvPr>
+            <p:cNvCxnSpPr/>
+            <p:nvPr/>
+          </p:nvCxnSpPr>
+          <p:spPr>
+            <a:xfrm>
+              <a:off x="3619567" y="4841756"/>
+              <a:ext cx="0" cy="1272988"/>
+            </a:xfrm>
+            <a:prstGeom prst="line">
+              <a:avLst/>
+            </a:prstGeom>
+            <a:ln w="19050">
+              <a:solidFill>
+                <a:schemeClr val="tx1"/>
+              </a:solidFill>
+            </a:ln>
+          </p:spPr>
+          <p:style>
+            <a:lnRef idx="1">
+              <a:schemeClr val="accent1"/>
+            </a:lnRef>
+            <a:fillRef idx="0">
+              <a:schemeClr val="accent1"/>
+            </a:fillRef>
+            <a:effectRef idx="0">
+              <a:schemeClr val="accent1"/>
+            </a:effectRef>
+            <a:fontRef idx="minor">
+              <a:schemeClr val="tx1"/>
+            </a:fontRef>
+          </p:style>
+        </p:cxnSp>
+        <p:sp>
+          <p:nvSpPr>
+            <p:cNvPr id="11" name="Elipse 10">
+              <a:extLst>
+                <a:ext uri="{FF2B5EF4-FFF2-40B4-BE49-F238E27FC236}">
+                  <a16:creationId xmlns:a16="http://schemas.microsoft.com/office/drawing/2014/main" id="{94105A38-B17F-D61F-C43A-A5A3E1273199}"/>
+                </a:ext>
+              </a:extLst>
+            </p:cNvPr>
+            <p:cNvSpPr/>
+            <p:nvPr/>
+          </p:nvSpPr>
+          <p:spPr>
+            <a:xfrm>
+              <a:off x="2007251" y="342900"/>
+              <a:ext cx="144000" cy="144000"/>
+            </a:xfrm>
+            <a:prstGeom prst="ellipse">
+              <a:avLst/>
+            </a:prstGeom>
+          </p:spPr>
+          <p:style>
+            <a:lnRef idx="2">
+              <a:schemeClr val="dk1">
+                <a:shade val="15000"/>
+              </a:schemeClr>
+            </a:lnRef>
+            <a:fillRef idx="1">
+              <a:schemeClr val="dk1"/>
+            </a:fillRef>
+            <a:effectRef idx="0">
+              <a:schemeClr val="dk1"/>
+            </a:effectRef>
+            <a:fontRef idx="minor">
+              <a:schemeClr val="lt1"/>
+            </a:fontRef>
+          </p:style>
+          <p:txBody>
+            <a:bodyPr rtlCol="0" anchor="ctr"/>
+            <a:lstStyle/>
+            <a:p>
+              <a:pPr algn="ctr"/>
+              <a:endParaRPr lang="pt-BR"/>
+            </a:p>
+          </p:txBody>
+        </p:sp>
+        <p:sp>
+          <p:nvSpPr>
+            <p:cNvPr id="12" name="Elipse 11">
+              <a:extLst>
+                <a:ext uri="{FF2B5EF4-FFF2-40B4-BE49-F238E27FC236}">
+                  <a16:creationId xmlns:a16="http://schemas.microsoft.com/office/drawing/2014/main" id="{543FD216-6D3A-8787-75D9-6124AAC87CC7}"/>
+                </a:ext>
+              </a:extLst>
+            </p:cNvPr>
+            <p:cNvSpPr/>
+            <p:nvPr/>
+          </p:nvSpPr>
+          <p:spPr>
+            <a:xfrm>
+              <a:off x="2007251" y="1595434"/>
+              <a:ext cx="144000" cy="144000"/>
+            </a:xfrm>
+            <a:prstGeom prst="ellipse">
+              <a:avLst/>
+            </a:prstGeom>
+          </p:spPr>
+          <p:style>
+            <a:lnRef idx="2">
+              <a:schemeClr val="dk1">
+                <a:shade val="15000"/>
+              </a:schemeClr>
+            </a:lnRef>
+            <a:fillRef idx="1">
+              <a:schemeClr val="dk1"/>
+            </a:fillRef>
+            <a:effectRef idx="0">
+              <a:schemeClr val="dk1"/>
+            </a:effectRef>
+            <a:fontRef idx="minor">
+              <a:schemeClr val="lt1"/>
+            </a:fontRef>
+          </p:style>
+          <p:txBody>
+            <a:bodyPr rtlCol="0" anchor="ctr"/>
+            <a:lstStyle/>
+            <a:p>
+              <a:pPr algn="ctr"/>
+              <a:endParaRPr lang="pt-BR"/>
+            </a:p>
+          </p:txBody>
+        </p:sp>
+        <p:sp>
+          <p:nvSpPr>
+            <p:cNvPr id="13" name="Elipse 12">
+              <a:extLst>
+                <a:ext uri="{FF2B5EF4-FFF2-40B4-BE49-F238E27FC236}">
+                  <a16:creationId xmlns:a16="http://schemas.microsoft.com/office/drawing/2014/main" id="{A624E806-308D-3BE0-AD89-0A1505A6C3FB}"/>
+                </a:ext>
+              </a:extLst>
+            </p:cNvPr>
+            <p:cNvSpPr/>
+            <p:nvPr/>
+          </p:nvSpPr>
+          <p:spPr>
+            <a:xfrm>
+              <a:off x="2208980" y="2224399"/>
+              <a:ext cx="144000" cy="144000"/>
+            </a:xfrm>
+            <a:prstGeom prst="ellipse">
+              <a:avLst/>
+            </a:prstGeom>
+          </p:spPr>
+          <p:style>
+            <a:lnRef idx="2">
+              <a:schemeClr val="dk1">
+                <a:shade val="15000"/>
+              </a:schemeClr>
+            </a:lnRef>
+            <a:fillRef idx="1">
+              <a:schemeClr val="dk1"/>
+            </a:fillRef>
+            <a:effectRef idx="0">
+              <a:schemeClr val="dk1"/>
+            </a:effectRef>
+            <a:fontRef idx="minor">
+              <a:schemeClr val="lt1"/>
+            </a:fontRef>
+          </p:style>
+          <p:txBody>
+            <a:bodyPr rtlCol="0" anchor="ctr"/>
+            <a:lstStyle/>
+            <a:p>
+              <a:pPr algn="ctr"/>
+              <a:endParaRPr lang="pt-BR"/>
+            </a:p>
+          </p:txBody>
+        </p:sp>
+        <p:sp>
+          <p:nvSpPr>
+            <p:cNvPr id="14" name="Elipse 13">
+              <a:extLst>
+                <a:ext uri="{FF2B5EF4-FFF2-40B4-BE49-F238E27FC236}">
+                  <a16:creationId xmlns:a16="http://schemas.microsoft.com/office/drawing/2014/main" id="{74B4528F-EDDE-DF53-EE37-DDB00DF70450}"/>
+                </a:ext>
+              </a:extLst>
+            </p:cNvPr>
+            <p:cNvSpPr/>
+            <p:nvPr/>
+          </p:nvSpPr>
+          <p:spPr>
+            <a:xfrm>
+              <a:off x="3155093" y="3575724"/>
+              <a:ext cx="144000" cy="144000"/>
+            </a:xfrm>
+            <a:prstGeom prst="ellipse">
+              <a:avLst/>
+            </a:prstGeom>
+          </p:spPr>
+          <p:style>
+            <a:lnRef idx="2">
+              <a:schemeClr val="dk1">
+                <a:shade val="15000"/>
+              </a:schemeClr>
+            </a:lnRef>
+            <a:fillRef idx="1">
+              <a:schemeClr val="dk1"/>
+            </a:fillRef>
+            <a:effectRef idx="0">
+              <a:schemeClr val="dk1"/>
+            </a:effectRef>
+            <a:fontRef idx="minor">
+              <a:schemeClr val="lt1"/>
+            </a:fontRef>
+          </p:style>
+          <p:txBody>
+            <a:bodyPr rtlCol="0" anchor="ctr"/>
+            <a:lstStyle/>
+            <a:p>
+              <a:pPr algn="ctr"/>
+              <a:endParaRPr lang="pt-BR"/>
+            </a:p>
+          </p:txBody>
+        </p:sp>
+        <p:sp>
+          <p:nvSpPr>
+            <p:cNvPr id="15" name="Elipse 14">
+              <a:extLst>
+                <a:ext uri="{FF2B5EF4-FFF2-40B4-BE49-F238E27FC236}">
+                  <a16:creationId xmlns:a16="http://schemas.microsoft.com/office/drawing/2014/main" id="{AC47EF6F-5A36-0487-A7B4-D4E789DC43C8}"/>
+                </a:ext>
+              </a:extLst>
+            </p:cNvPr>
+            <p:cNvSpPr/>
+            <p:nvPr/>
+          </p:nvSpPr>
+          <p:spPr>
+            <a:xfrm>
+              <a:off x="3547567" y="4798734"/>
+              <a:ext cx="144000" cy="144000"/>
+            </a:xfrm>
+            <a:prstGeom prst="ellipse">
+              <a:avLst/>
+            </a:prstGeom>
+          </p:spPr>
+          <p:style>
+            <a:lnRef idx="2">
+              <a:schemeClr val="dk1">
+                <a:shade val="15000"/>
+              </a:schemeClr>
+            </a:lnRef>
+            <a:fillRef idx="1">
+              <a:schemeClr val="dk1"/>
+            </a:fillRef>
+            <a:effectRef idx="0">
+              <a:schemeClr val="dk1"/>
+            </a:effectRef>
+            <a:fontRef idx="minor">
+              <a:schemeClr val="lt1"/>
+            </a:fontRef>
+          </p:style>
+          <p:txBody>
+            <a:bodyPr rtlCol="0" anchor="ctr"/>
+            <a:lstStyle/>
+            <a:p>
+              <a:pPr algn="ctr"/>
+              <a:endParaRPr lang="pt-BR"/>
+            </a:p>
+          </p:txBody>
+        </p:sp>
+        <p:sp>
+          <p:nvSpPr>
+            <p:cNvPr id="16" name="Elipse 15">
+              <a:extLst>
+                <a:ext uri="{FF2B5EF4-FFF2-40B4-BE49-F238E27FC236}">
+                  <a16:creationId xmlns:a16="http://schemas.microsoft.com/office/drawing/2014/main" id="{8AC26941-3372-B079-FED4-69DE720A8DEB}"/>
+                </a:ext>
+              </a:extLst>
+            </p:cNvPr>
+            <p:cNvSpPr/>
+            <p:nvPr/>
+          </p:nvSpPr>
+          <p:spPr>
+            <a:xfrm>
+              <a:off x="3547567" y="6013766"/>
+              <a:ext cx="144000" cy="144000"/>
+            </a:xfrm>
+            <a:prstGeom prst="ellipse">
+              <a:avLst/>
+            </a:prstGeom>
+          </p:spPr>
+          <p:style>
+            <a:lnRef idx="2">
+              <a:schemeClr val="dk1">
+                <a:shade val="15000"/>
+              </a:schemeClr>
+            </a:lnRef>
+            <a:fillRef idx="1">
+              <a:schemeClr val="dk1"/>
+            </a:fillRef>
+            <a:effectRef idx="0">
+              <a:schemeClr val="dk1"/>
+            </a:effectRef>
+            <a:fontRef idx="minor">
+              <a:schemeClr val="lt1"/>
+            </a:fontRef>
+          </p:style>
+          <p:txBody>
+            <a:bodyPr rtlCol="0" anchor="ctr"/>
+            <a:lstStyle/>
+            <a:p>
+              <a:pPr algn="ctr"/>
+              <a:endParaRPr lang="pt-BR"/>
+            </a:p>
+          </p:txBody>
+        </p:sp>
+        <p:cxnSp>
+          <p:nvCxnSpPr>
+            <p:cNvPr id="17" name="Conector reto 16">
+              <a:extLst>
+                <a:ext uri="{FF2B5EF4-FFF2-40B4-BE49-F238E27FC236}">
+                  <a16:creationId xmlns:a16="http://schemas.microsoft.com/office/drawing/2014/main" id="{59843331-92B7-0DB8-4771-5AB5648A455C}"/>
+                </a:ext>
+              </a:extLst>
+            </p:cNvPr>
+            <p:cNvCxnSpPr>
+              <a:cxnSpLocks/>
+            </p:cNvCxnSpPr>
+            <p:nvPr/>
+          </p:nvCxnSpPr>
+          <p:spPr>
+            <a:xfrm flipH="1">
+              <a:off x="587849" y="3072272"/>
+              <a:ext cx="720000" cy="0"/>
             </a:xfrm>
             <a:prstGeom prst="line">
               <a:avLst/>
@@ -6026,7 +8270,8 @@
               <a:solidFill>
                 <a:schemeClr val="tx1"/>
               </a:solidFill>
-              <a:prstDash val="dash"/>
+              <a:headEnd type="arrow" w="med" len="med"/>
+              <a:tailEnd type="none" w="med" len="med"/>
             </a:ln>
           </p:spPr>
           <p:style>
@@ -6048,10 +8293,10 @@
         </p:cxnSp>
         <p:cxnSp>
           <p:nvCxnSpPr>
-            <p:cNvPr id="7" name="Conector reto 6">
+            <p:cNvPr id="18" name="Conector reto 17">
               <a:extLst>
                 <a:ext uri="{FF2B5EF4-FFF2-40B4-BE49-F238E27FC236}">
-                  <a16:creationId xmlns:a16="http://schemas.microsoft.com/office/drawing/2014/main" id="{1F045A3F-B20A-FBF0-12F2-2967C17A7B20}"/>
+                  <a16:creationId xmlns:a16="http://schemas.microsoft.com/office/drawing/2014/main" id="{BE3F114B-A89D-9F4C-FE78-ADFE2A8ED52D}"/>
                 </a:ext>
               </a:extLst>
             </p:cNvPr>
@@ -6061,9 +8306,9 @@
             <p:nvPr/>
           </p:nvCxnSpPr>
           <p:spPr>
-            <a:xfrm flipH="1">
-              <a:off x="4527176" y="820270"/>
-              <a:ext cx="4213412" cy="0"/>
+            <a:xfrm flipV="1">
+              <a:off x="593020" y="3081236"/>
+              <a:ext cx="0" cy="720914"/>
             </a:xfrm>
             <a:prstGeom prst="line">
               <a:avLst/>
@@ -6073,6 +8318,8 @@
               <a:solidFill>
                 <a:schemeClr val="tx1"/>
               </a:solidFill>
+              <a:headEnd type="arrow" w="med" len="med"/>
+              <a:tailEnd type="none" w="med" len="med"/>
             </a:ln>
           </p:spPr>
           <p:style>
@@ -6092,12 +8339,266 @@
             </a:fontRef>
           </p:style>
         </p:cxnSp>
+        <p:sp>
+          <p:nvSpPr>
+            <p:cNvPr id="19" name="CaixaDeTexto 18">
+              <a:extLst>
+                <a:ext uri="{FF2B5EF4-FFF2-40B4-BE49-F238E27FC236}">
+                  <a16:creationId xmlns:a16="http://schemas.microsoft.com/office/drawing/2014/main" id="{E684D274-E696-742D-B0FC-AB1CFC69F225}"/>
+                </a:ext>
+              </a:extLst>
+            </p:cNvPr>
+            <p:cNvSpPr txBox="1"/>
+            <p:nvPr/>
+          </p:nvSpPr>
+          <p:spPr>
+            <a:xfrm>
+              <a:off x="1373152" y="2810662"/>
+              <a:ext cx="417102" cy="523220"/>
+            </a:xfrm>
+            <a:prstGeom prst="rect">
+              <a:avLst/>
+            </a:prstGeom>
+            <a:noFill/>
+          </p:spPr>
+          <p:txBody>
+            <a:bodyPr wrap="none" rtlCol="0">
+              <a:spAutoFit/>
+            </a:bodyPr>
+            <a:lstStyle/>
+            <a:p>
+              <a:r>
+                <a:rPr lang="pt-BR" sz="2800" dirty="0"/>
+                <a:t>N</a:t>
+              </a:r>
+            </a:p>
+          </p:txBody>
+        </p:sp>
+        <p:sp>
+          <p:nvSpPr>
+            <p:cNvPr id="20" name="CaixaDeTexto 19">
+              <a:extLst>
+                <a:ext uri="{FF2B5EF4-FFF2-40B4-BE49-F238E27FC236}">
+                  <a16:creationId xmlns:a16="http://schemas.microsoft.com/office/drawing/2014/main" id="{41FA1A5C-1A92-60FC-1D88-1DA8EDC813B0}"/>
+                </a:ext>
+              </a:extLst>
+            </p:cNvPr>
+            <p:cNvSpPr txBox="1"/>
+            <p:nvPr/>
+          </p:nvSpPr>
+          <p:spPr>
+            <a:xfrm>
+              <a:off x="716007" y="3540540"/>
+              <a:ext cx="388248" cy="523220"/>
+            </a:xfrm>
+            <a:prstGeom prst="rect">
+              <a:avLst/>
+            </a:prstGeom>
+            <a:noFill/>
+          </p:spPr>
+          <p:txBody>
+            <a:bodyPr wrap="none" rtlCol="0">
+              <a:spAutoFit/>
+            </a:bodyPr>
+            <a:lstStyle/>
+            <a:p>
+              <a:r>
+                <a:rPr lang="pt-BR" sz="2800" dirty="0"/>
+                <a:t>V</a:t>
+              </a:r>
+            </a:p>
+          </p:txBody>
+        </p:sp>
+        <p:sp>
+          <p:nvSpPr>
+            <p:cNvPr id="21" name="CaixaDeTexto 20">
+              <a:extLst>
+                <a:ext uri="{FF2B5EF4-FFF2-40B4-BE49-F238E27FC236}">
+                  <a16:creationId xmlns:a16="http://schemas.microsoft.com/office/drawing/2014/main" id="{8E41087A-1EAF-A2DE-170D-7AE493BCD571}"/>
+                </a:ext>
+              </a:extLst>
+            </p:cNvPr>
+            <p:cNvSpPr txBox="1"/>
+            <p:nvPr/>
+          </p:nvSpPr>
+          <p:spPr>
+            <a:xfrm rot="5400000">
+              <a:off x="1779999" y="811930"/>
+              <a:ext cx="889987" cy="369332"/>
+            </a:xfrm>
+            <a:prstGeom prst="rect">
+              <a:avLst/>
+            </a:prstGeom>
+            <a:noFill/>
+          </p:spPr>
+          <p:txBody>
+            <a:bodyPr wrap="none" rtlCol="0">
+              <a:spAutoFit/>
+            </a:bodyPr>
+            <a:lstStyle/>
+            <a:p>
+              <a:r>
+                <a:rPr lang="pt-BR" dirty="0"/>
+                <a:t>1000 m</a:t>
+              </a:r>
+            </a:p>
+          </p:txBody>
+        </p:sp>
+        <p:sp>
+          <p:nvSpPr>
+            <p:cNvPr id="22" name="CaixaDeTexto 21">
+              <a:extLst>
+                <a:ext uri="{FF2B5EF4-FFF2-40B4-BE49-F238E27FC236}">
+                  <a16:creationId xmlns:a16="http://schemas.microsoft.com/office/drawing/2014/main" id="{E8337A48-86EE-A65B-0687-2C18F3381B4E}"/>
+                </a:ext>
+              </a:extLst>
+            </p:cNvPr>
+            <p:cNvSpPr txBox="1"/>
+            <p:nvPr/>
+          </p:nvSpPr>
+          <p:spPr>
+            <a:xfrm rot="3289896">
+              <a:off x="2371931" y="2653863"/>
+              <a:ext cx="889987" cy="369332"/>
+            </a:xfrm>
+            <a:prstGeom prst="rect">
+              <a:avLst/>
+            </a:prstGeom>
+            <a:noFill/>
+          </p:spPr>
+          <p:txBody>
+            <a:bodyPr wrap="none" rtlCol="0">
+              <a:spAutoFit/>
+            </a:bodyPr>
+            <a:lstStyle/>
+            <a:p>
+              <a:r>
+                <a:rPr lang="pt-BR" dirty="0"/>
+                <a:t>1500 m</a:t>
+              </a:r>
+            </a:p>
+          </p:txBody>
+        </p:sp>
+        <p:sp>
+          <p:nvSpPr>
+            <p:cNvPr id="23" name="CaixaDeTexto 22">
+              <a:extLst>
+                <a:ext uri="{FF2B5EF4-FFF2-40B4-BE49-F238E27FC236}">
+                  <a16:creationId xmlns:a16="http://schemas.microsoft.com/office/drawing/2014/main" id="{672FD7F9-6BDD-6781-9E90-518B03FAE1D8}"/>
+                </a:ext>
+              </a:extLst>
+            </p:cNvPr>
+            <p:cNvSpPr txBox="1"/>
+            <p:nvPr/>
+          </p:nvSpPr>
+          <p:spPr>
+            <a:xfrm rot="5400000">
+              <a:off x="3417508" y="5324773"/>
+              <a:ext cx="772969" cy="369332"/>
+            </a:xfrm>
+            <a:prstGeom prst="rect">
+              <a:avLst/>
+            </a:prstGeom>
+            <a:noFill/>
+          </p:spPr>
+          <p:txBody>
+            <a:bodyPr wrap="none" rtlCol="0">
+              <a:spAutoFit/>
+            </a:bodyPr>
+            <a:lstStyle/>
+            <a:p>
+              <a:r>
+                <a:rPr lang="pt-BR" dirty="0"/>
+                <a:t>500 m</a:t>
+              </a:r>
+            </a:p>
+          </p:txBody>
+        </p:sp>
         <p:cxnSp>
           <p:nvCxnSpPr>
-            <p:cNvPr id="14" name="Conector reto 13">
+            <p:cNvPr id="27" name="Conector de Seta Reta 26">
               <a:extLst>
                 <a:ext uri="{FF2B5EF4-FFF2-40B4-BE49-F238E27FC236}">
-                  <a16:creationId xmlns:a16="http://schemas.microsoft.com/office/drawing/2014/main" id="{266C85B1-2203-61B6-AF9A-95BB89CE1733}"/>
+                  <a16:creationId xmlns:a16="http://schemas.microsoft.com/office/drawing/2014/main" id="{9926B709-7F36-E544-149D-96AA00A87DAF}"/>
+                </a:ext>
+              </a:extLst>
+            </p:cNvPr>
+            <p:cNvCxnSpPr>
+              <a:cxnSpLocks/>
+            </p:cNvCxnSpPr>
+            <p:nvPr/>
+          </p:nvCxnSpPr>
+          <p:spPr>
+            <a:xfrm flipH="1">
+              <a:off x="2190176" y="1667434"/>
+              <a:ext cx="964917" cy="451690"/>
+            </a:xfrm>
+            <a:prstGeom prst="straightConnector1">
+              <a:avLst/>
+            </a:prstGeom>
+            <a:ln w="12700">
+              <a:solidFill>
+                <a:schemeClr val="tx1"/>
+              </a:solidFill>
+              <a:tailEnd type="triangle"/>
+            </a:ln>
+          </p:spPr>
+          <p:style>
+            <a:lnRef idx="1">
+              <a:schemeClr val="accent1"/>
+            </a:lnRef>
+            <a:fillRef idx="0">
+              <a:schemeClr val="accent1"/>
+            </a:fillRef>
+            <a:effectRef idx="0">
+              <a:schemeClr val="accent1"/>
+            </a:effectRef>
+            <a:fontRef idx="minor">
+              <a:schemeClr val="tx1"/>
+            </a:fontRef>
+          </p:style>
+        </p:cxnSp>
+        <p:sp>
+          <p:nvSpPr>
+            <p:cNvPr id="29" name="CaixaDeTexto 28">
+              <a:extLst>
+                <a:ext uri="{FF2B5EF4-FFF2-40B4-BE49-F238E27FC236}">
+                  <a16:creationId xmlns:a16="http://schemas.microsoft.com/office/drawing/2014/main" id="{FA90FF05-94FD-FADC-D398-792167FA93E4}"/>
+                </a:ext>
+              </a:extLst>
+            </p:cNvPr>
+            <p:cNvSpPr txBox="1"/>
+            <p:nvPr/>
+          </p:nvSpPr>
+          <p:spPr>
+            <a:xfrm rot="20115295">
+              <a:off x="2162026" y="1580074"/>
+              <a:ext cx="968535" cy="369332"/>
+            </a:xfrm>
+            <a:prstGeom prst="rect">
+              <a:avLst/>
+            </a:prstGeom>
+            <a:noFill/>
+          </p:spPr>
+          <p:txBody>
+            <a:bodyPr wrap="none" rtlCol="0">
+              <a:spAutoFit/>
+            </a:bodyPr>
+            <a:lstStyle/>
+            <a:p>
+              <a:r>
+                <a:rPr lang="pt-BR" dirty="0"/>
+                <a:t>r=500 m</a:t>
+              </a:r>
+            </a:p>
+          </p:txBody>
+        </p:sp>
+        <p:cxnSp>
+          <p:nvCxnSpPr>
+            <p:cNvPr id="30" name="Conector de Seta Reta 29">
+              <a:extLst>
+                <a:ext uri="{FF2B5EF4-FFF2-40B4-BE49-F238E27FC236}">
+                  <a16:creationId xmlns:a16="http://schemas.microsoft.com/office/drawing/2014/main" id="{D809379D-F2F5-F381-B409-4588C9945604}"/>
                 </a:ext>
               </a:extLst>
             </p:cNvPr>
@@ -6108,42 +8609,166 @@
           </p:nvCxnSpPr>
           <p:spPr>
             <a:xfrm flipV="1">
-              <a:off x="8740588" y="820270"/>
-              <a:ext cx="0" cy="3218329"/>
+              <a:off x="1420954" y="4276629"/>
+              <a:ext cx="2057259" cy="666105"/>
             </a:xfrm>
-            <a:prstGeom prst="line">
+            <a:prstGeom prst="straightConnector1">
+              <a:avLst/>
+            </a:prstGeom>
+            <a:ln w="12700">
+              <a:solidFill>
+                <a:schemeClr val="tx1"/>
+              </a:solidFill>
+              <a:tailEnd type="triangle"/>
+            </a:ln>
+          </p:spPr>
+          <p:style>
+            <a:lnRef idx="1">
+              <a:schemeClr val="accent1"/>
+            </a:lnRef>
+            <a:fillRef idx="0">
+              <a:schemeClr val="accent1"/>
+            </a:fillRef>
+            <a:effectRef idx="0">
+              <a:schemeClr val="accent1"/>
+            </a:effectRef>
+            <a:fontRef idx="minor">
+              <a:schemeClr val="tx1"/>
+            </a:fontRef>
+          </p:style>
+        </p:cxnSp>
+        <p:sp>
+          <p:nvSpPr>
+            <p:cNvPr id="31" name="CaixaDeTexto 30">
+              <a:extLst>
+                <a:ext uri="{FF2B5EF4-FFF2-40B4-BE49-F238E27FC236}">
+                  <a16:creationId xmlns:a16="http://schemas.microsoft.com/office/drawing/2014/main" id="{71F2F51D-04B0-3EB4-85AA-C6016AABB0CE}"/>
+                </a:ext>
+              </a:extLst>
+            </p:cNvPr>
+            <p:cNvSpPr txBox="1"/>
+            <p:nvPr/>
+          </p:nvSpPr>
+          <p:spPr>
+            <a:xfrm rot="20543233">
+              <a:off x="1906805" y="4290508"/>
+              <a:ext cx="1085554" cy="369332"/>
+            </a:xfrm>
+            <a:prstGeom prst="rect">
               <a:avLst/>
             </a:prstGeom>
             <a:noFill/>
-            <a:ln w="19050">
+          </p:spPr>
+          <p:txBody>
+            <a:bodyPr wrap="none" rtlCol="0">
+              <a:spAutoFit/>
+            </a:bodyPr>
+            <a:lstStyle/>
+            <a:p>
+              <a:r>
+                <a:rPr lang="pt-BR" dirty="0"/>
+                <a:t>r=1000 m</a:t>
+              </a:r>
+            </a:p>
+          </p:txBody>
+        </p:sp>
+        <p:sp>
+          <p:nvSpPr>
+            <p:cNvPr id="37" name="CaixaDeTexto 36">
+              <a:extLst>
+                <a:ext uri="{FF2B5EF4-FFF2-40B4-BE49-F238E27FC236}">
+                  <a16:creationId xmlns:a16="http://schemas.microsoft.com/office/drawing/2014/main" id="{37C7A266-F5A2-84AE-7147-933F02BBD65A}"/>
+                </a:ext>
+              </a:extLst>
+            </p:cNvPr>
+            <p:cNvSpPr txBox="1"/>
+            <p:nvPr/>
+          </p:nvSpPr>
+          <p:spPr>
+            <a:xfrm>
+              <a:off x="2208980" y="2700168"/>
+              <a:ext cx="500458" cy="369332"/>
+            </a:xfrm>
+            <a:prstGeom prst="rect">
+              <a:avLst/>
+            </a:prstGeom>
+            <a:noFill/>
+          </p:spPr>
+          <p:txBody>
+            <a:bodyPr wrap="none" rtlCol="0">
+              <a:spAutoFit/>
+            </a:bodyPr>
+            <a:lstStyle/>
+            <a:p>
+              <a:r>
+                <a:rPr lang="pt-BR" dirty="0"/>
+                <a:t>15</a:t>
+              </a:r>
+              <a:r>
+                <a:rPr lang="pt-BR" baseline="30000" dirty="0"/>
+                <a:t>o</a:t>
+              </a:r>
+            </a:p>
+          </p:txBody>
+        </p:sp>
+        <p:sp>
+          <p:nvSpPr>
+            <p:cNvPr id="38" name="Arco 37">
+              <a:extLst>
+                <a:ext uri="{FF2B5EF4-FFF2-40B4-BE49-F238E27FC236}">
+                  <a16:creationId xmlns:a16="http://schemas.microsoft.com/office/drawing/2014/main" id="{706886A7-B293-665B-E8F9-87B5EE451688}"/>
+                </a:ext>
+              </a:extLst>
+            </p:cNvPr>
+            <p:cNvSpPr/>
+            <p:nvPr/>
+          </p:nvSpPr>
+          <p:spPr>
+            <a:xfrm rot="5400000">
+              <a:off x="1902996" y="2018320"/>
+              <a:ext cx="722845" cy="756119"/>
+            </a:xfrm>
+            <a:prstGeom prst="arc">
+              <a:avLst>
+                <a:gd name="adj1" fmla="val 18905484"/>
+                <a:gd name="adj2" fmla="val 21381862"/>
+              </a:avLst>
+            </a:prstGeom>
+            <a:ln w="12700">
               <a:solidFill>
                 <a:schemeClr val="tx1"/>
               </a:solidFill>
             </a:ln>
           </p:spPr>
           <p:style>
-            <a:lnRef idx="2">
-              <a:schemeClr val="accent1">
-                <a:shade val="15000"/>
-              </a:schemeClr>
+            <a:lnRef idx="1">
+              <a:schemeClr val="accent1"/>
             </a:lnRef>
-            <a:fillRef idx="1">
+            <a:fillRef idx="0">
               <a:schemeClr val="accent1"/>
             </a:fillRef>
             <a:effectRef idx="0">
               <a:schemeClr val="accent1"/>
             </a:effectRef>
             <a:fontRef idx="minor">
-              <a:schemeClr val="lt1"/>
+              <a:schemeClr val="tx1"/>
             </a:fontRef>
           </p:style>
-        </p:cxnSp>
+          <p:txBody>
+            <a:bodyPr rtlCol="0" anchor="ctr"/>
+            <a:lstStyle/>
+            <a:p>
+              <a:pPr algn="ctr"/>
+              <a:endParaRPr lang="pt-BR"/>
+            </a:p>
+          </p:txBody>
+        </p:sp>
         <p:cxnSp>
           <p:nvCxnSpPr>
-            <p:cNvPr id="20" name="Conector reto 19">
+            <p:cNvPr id="40" name="Conector reto 39">
               <a:extLst>
                 <a:ext uri="{FF2B5EF4-FFF2-40B4-BE49-F238E27FC236}">
-                  <a16:creationId xmlns:a16="http://schemas.microsoft.com/office/drawing/2014/main" id="{C1C80C8D-BA97-95C3-E58D-45A16166F13D}"/>
+                  <a16:creationId xmlns:a16="http://schemas.microsoft.com/office/drawing/2014/main" id="{7E8603A5-7DF3-2039-7802-94C46EDDA5D7}"/>
                 </a:ext>
               </a:extLst>
             </p:cNvPr>
@@ -6153,1518 +8778,214 @@
             <p:nvPr/>
           </p:nvCxnSpPr>
           <p:spPr>
-            <a:xfrm flipV="1">
-              <a:off x="4527176" y="820270"/>
-              <a:ext cx="0" cy="3218329"/>
+            <a:xfrm>
+              <a:off x="2280980" y="2249799"/>
+              <a:ext cx="0" cy="929299"/>
             </a:xfrm>
             <a:prstGeom prst="line">
               <a:avLst/>
             </a:prstGeom>
-            <a:noFill/>
-            <a:ln w="19050">
+            <a:ln w="12700">
               <a:solidFill>
                 <a:schemeClr val="tx1"/>
               </a:solidFill>
-              <a:prstDash val="dash"/>
             </a:ln>
           </p:spPr>
           <p:style>
-            <a:lnRef idx="2">
-              <a:schemeClr val="accent1">
-                <a:shade val="15000"/>
-              </a:schemeClr>
+            <a:lnRef idx="1">
+              <a:schemeClr val="accent1"/>
             </a:lnRef>
-            <a:fillRef idx="1">
+            <a:fillRef idx="0">
               <a:schemeClr val="accent1"/>
             </a:fillRef>
             <a:effectRef idx="0">
               <a:schemeClr val="accent1"/>
             </a:effectRef>
             <a:fontRef idx="minor">
-              <a:schemeClr val="lt1"/>
+              <a:schemeClr val="tx1"/>
             </a:fontRef>
           </p:style>
         </p:cxnSp>
-        <p:cxnSp>
-          <p:nvCxnSpPr>
-            <p:cNvPr id="21" name="Conector reto 20">
+        <p:sp>
+          <p:nvSpPr>
+            <p:cNvPr id="42" name="CaixaDeTexto 41">
               <a:extLst>
                 <a:ext uri="{FF2B5EF4-FFF2-40B4-BE49-F238E27FC236}">
-                  <a16:creationId xmlns:a16="http://schemas.microsoft.com/office/drawing/2014/main" id="{3515D2A6-642A-DFF1-211D-8D6E9C07D49A}"/>
+                  <a16:creationId xmlns:a16="http://schemas.microsoft.com/office/drawing/2014/main" id="{20DC3D68-E673-7B77-1804-92B2932F3F26}"/>
                 </a:ext>
               </a:extLst>
             </p:cNvPr>
-            <p:cNvCxnSpPr>
-              <a:cxnSpLocks/>
-            </p:cNvCxnSpPr>
+            <p:cNvSpPr txBox="1"/>
             <p:nvPr/>
-          </p:nvCxnSpPr>
+          </p:nvSpPr>
           <p:spPr>
-            <a:xfrm flipH="1">
-              <a:off x="4527176" y="4035909"/>
-              <a:ext cx="4213412" cy="0"/>
+            <a:xfrm>
+              <a:off x="1726759" y="822071"/>
+              <a:ext cx="332749" cy="461665"/>
             </a:xfrm>
-            <a:prstGeom prst="line">
+            <a:prstGeom prst="rect">
               <a:avLst/>
             </a:prstGeom>
             <a:noFill/>
-            <a:ln w="19050">
-              <a:solidFill>
-                <a:schemeClr val="tx1"/>
-              </a:solidFill>
-              <a:prstDash val="dash"/>
-            </a:ln>
           </p:spPr>
-          <p:style>
-            <a:lnRef idx="2">
-              <a:schemeClr val="accent1">
-                <a:shade val="15000"/>
-              </a:schemeClr>
-            </a:lnRef>
-            <a:fillRef idx="1">
-              <a:schemeClr val="accent1"/>
-            </a:fillRef>
-            <a:effectRef idx="0">
-              <a:schemeClr val="accent1"/>
-            </a:effectRef>
-            <a:fontRef idx="minor">
-              <a:schemeClr val="lt1"/>
-            </a:fontRef>
-          </p:style>
-        </p:cxnSp>
+          <p:txBody>
+            <a:bodyPr wrap="square" rtlCol="0">
+              <a:spAutoFit/>
+            </a:bodyPr>
+            <a:lstStyle/>
+            <a:p>
+              <a:r>
+                <a:rPr lang="pt-BR" sz="2400" b="1" dirty="0"/>
+                <a:t>1</a:t>
+              </a:r>
+            </a:p>
+          </p:txBody>
+        </p:sp>
+        <p:sp>
+          <p:nvSpPr>
+            <p:cNvPr id="43" name="CaixaDeTexto 42">
+              <a:extLst>
+                <a:ext uri="{FF2B5EF4-FFF2-40B4-BE49-F238E27FC236}">
+                  <a16:creationId xmlns:a16="http://schemas.microsoft.com/office/drawing/2014/main" id="{BB32DC00-7490-FEB9-0832-CEE1D54732A2}"/>
+                </a:ext>
+              </a:extLst>
+            </p:cNvPr>
+            <p:cNvSpPr txBox="1"/>
+            <p:nvPr/>
+          </p:nvSpPr>
+          <p:spPr>
+            <a:xfrm>
+              <a:off x="1779785" y="1766035"/>
+              <a:ext cx="332749" cy="461665"/>
+            </a:xfrm>
+            <a:prstGeom prst="rect">
+              <a:avLst/>
+            </a:prstGeom>
+            <a:noFill/>
+          </p:spPr>
+          <p:txBody>
+            <a:bodyPr wrap="square" rtlCol="0">
+              <a:spAutoFit/>
+            </a:bodyPr>
+            <a:lstStyle/>
+            <a:p>
+              <a:r>
+                <a:rPr lang="pt-BR" sz="2400" b="1" dirty="0"/>
+                <a:t>2</a:t>
+              </a:r>
+            </a:p>
+          </p:txBody>
+        </p:sp>
+        <p:sp>
+          <p:nvSpPr>
+            <p:cNvPr id="44" name="CaixaDeTexto 43">
+              <a:extLst>
+                <a:ext uri="{FF2B5EF4-FFF2-40B4-BE49-F238E27FC236}">
+                  <a16:creationId xmlns:a16="http://schemas.microsoft.com/office/drawing/2014/main" id="{A9554C2D-1559-A0BB-79BA-AE9104FE005E}"/>
+                </a:ext>
+              </a:extLst>
+            </p:cNvPr>
+            <p:cNvSpPr txBox="1"/>
+            <p:nvPr/>
+          </p:nvSpPr>
+          <p:spPr>
+            <a:xfrm>
+              <a:off x="2496075" y="2954183"/>
+              <a:ext cx="332749" cy="461665"/>
+            </a:xfrm>
+            <a:prstGeom prst="rect">
+              <a:avLst/>
+            </a:prstGeom>
+            <a:noFill/>
+          </p:spPr>
+          <p:txBody>
+            <a:bodyPr wrap="square" rtlCol="0">
+              <a:spAutoFit/>
+            </a:bodyPr>
+            <a:lstStyle/>
+            <a:p>
+              <a:r>
+                <a:rPr lang="pt-BR" sz="2400" b="1" dirty="0"/>
+                <a:t>3</a:t>
+              </a:r>
+            </a:p>
+          </p:txBody>
+        </p:sp>
+        <p:sp>
+          <p:nvSpPr>
+            <p:cNvPr id="45" name="CaixaDeTexto 44">
+              <a:extLst>
+                <a:ext uri="{FF2B5EF4-FFF2-40B4-BE49-F238E27FC236}">
+                  <a16:creationId xmlns:a16="http://schemas.microsoft.com/office/drawing/2014/main" id="{B5763DC6-4832-F040-9A59-302E2AFF10B3}"/>
+                </a:ext>
+              </a:extLst>
+            </p:cNvPr>
+            <p:cNvSpPr txBox="1"/>
+            <p:nvPr/>
+          </p:nvSpPr>
+          <p:spPr>
+            <a:xfrm>
+              <a:off x="3084128" y="3882761"/>
+              <a:ext cx="332749" cy="461665"/>
+            </a:xfrm>
+            <a:prstGeom prst="rect">
+              <a:avLst/>
+            </a:prstGeom>
+            <a:noFill/>
+          </p:spPr>
+          <p:txBody>
+            <a:bodyPr wrap="square" rtlCol="0">
+              <a:spAutoFit/>
+            </a:bodyPr>
+            <a:lstStyle/>
+            <a:p>
+              <a:r>
+                <a:rPr lang="pt-BR" sz="2400" b="1" dirty="0"/>
+                <a:t>4</a:t>
+              </a:r>
+            </a:p>
+          </p:txBody>
+        </p:sp>
+        <p:sp>
+          <p:nvSpPr>
+            <p:cNvPr id="46" name="CaixaDeTexto 45">
+              <a:extLst>
+                <a:ext uri="{FF2B5EF4-FFF2-40B4-BE49-F238E27FC236}">
+                  <a16:creationId xmlns:a16="http://schemas.microsoft.com/office/drawing/2014/main" id="{CA620155-B516-23D5-D88A-D35EF9458F86}"/>
+                </a:ext>
+              </a:extLst>
+            </p:cNvPr>
+            <p:cNvSpPr txBox="1"/>
+            <p:nvPr/>
+          </p:nvSpPr>
+          <p:spPr>
+            <a:xfrm>
+              <a:off x="3230880" y="5268806"/>
+              <a:ext cx="332749" cy="461665"/>
+            </a:xfrm>
+            <a:prstGeom prst="rect">
+              <a:avLst/>
+            </a:prstGeom>
+            <a:noFill/>
+          </p:spPr>
+          <p:txBody>
+            <a:bodyPr wrap="square" rtlCol="0">
+              <a:spAutoFit/>
+            </a:bodyPr>
+            <a:lstStyle/>
+            <a:p>
+              <a:r>
+                <a:rPr lang="pt-BR" sz="2400" b="1" dirty="0"/>
+                <a:t>5</a:t>
+              </a:r>
+            </a:p>
+          </p:txBody>
+        </p:sp>
       </p:grpSp>
-      <p:sp>
-        <p:nvSpPr>
-          <p:cNvPr id="3" name="Elipse 2">
-            <a:extLst>
-              <a:ext uri="{FF2B5EF4-FFF2-40B4-BE49-F238E27FC236}">
-                <a16:creationId xmlns:a16="http://schemas.microsoft.com/office/drawing/2014/main" id="{D9613E0E-593B-E0C0-8B8B-399904E4123F}"/>
-              </a:ext>
-            </a:extLst>
-          </p:cNvPr>
-          <p:cNvSpPr/>
-          <p:nvPr/>
-        </p:nvSpPr>
-        <p:spPr>
-          <a:xfrm>
-            <a:off x="2751881" y="2205036"/>
-            <a:ext cx="144000" cy="144000"/>
-          </a:xfrm>
-          <a:prstGeom prst="ellipse">
-            <a:avLst/>
-          </a:prstGeom>
-        </p:spPr>
-        <p:style>
-          <a:lnRef idx="2">
-            <a:schemeClr val="dk1">
-              <a:shade val="15000"/>
-            </a:schemeClr>
-          </a:lnRef>
-          <a:fillRef idx="1">
-            <a:schemeClr val="dk1"/>
-          </a:fillRef>
-          <a:effectRef idx="0">
-            <a:schemeClr val="dk1"/>
-          </a:effectRef>
-          <a:fontRef idx="minor">
-            <a:schemeClr val="lt1"/>
-          </a:fontRef>
-        </p:style>
-        <p:txBody>
-          <a:bodyPr rtlCol="0" anchor="ctr"/>
-          <a:lstStyle/>
-          <a:p>
-            <a:pPr algn="ctr"/>
-            <a:endParaRPr lang="pt-BR"/>
-          </a:p>
-        </p:txBody>
-      </p:sp>
-      <p:sp>
-        <p:nvSpPr>
-          <p:cNvPr id="4" name="Elipse 3">
-            <a:extLst>
-              <a:ext uri="{FF2B5EF4-FFF2-40B4-BE49-F238E27FC236}">
-                <a16:creationId xmlns:a16="http://schemas.microsoft.com/office/drawing/2014/main" id="{917ECF6C-B02C-4443-1564-5F4E08A8AF67}"/>
-              </a:ext>
-            </a:extLst>
-          </p:cNvPr>
-          <p:cNvSpPr/>
-          <p:nvPr/>
-        </p:nvSpPr>
-        <p:spPr>
-          <a:xfrm>
-            <a:off x="8668588" y="3963909"/>
-            <a:ext cx="144000" cy="144000"/>
-          </a:xfrm>
-          <a:prstGeom prst="ellipse">
-            <a:avLst/>
-          </a:prstGeom>
-        </p:spPr>
-        <p:style>
-          <a:lnRef idx="2">
-            <a:schemeClr val="dk1">
-              <a:shade val="15000"/>
-            </a:schemeClr>
-          </a:lnRef>
-          <a:fillRef idx="1">
-            <a:schemeClr val="dk1"/>
-          </a:fillRef>
-          <a:effectRef idx="0">
-            <a:schemeClr val="dk1"/>
-          </a:effectRef>
-          <a:fontRef idx="minor">
-            <a:schemeClr val="lt1"/>
-          </a:fontRef>
-        </p:style>
-        <p:txBody>
-          <a:bodyPr rtlCol="0" anchor="ctr"/>
-          <a:lstStyle/>
-          <a:p>
-            <a:pPr algn="ctr"/>
-            <a:endParaRPr lang="pt-BR"/>
-          </a:p>
-        </p:txBody>
-      </p:sp>
-      <p:sp>
-        <p:nvSpPr>
-          <p:cNvPr id="6" name="CaixaDeTexto 5">
-            <a:extLst>
-              <a:ext uri="{FF2B5EF4-FFF2-40B4-BE49-F238E27FC236}">
-                <a16:creationId xmlns:a16="http://schemas.microsoft.com/office/drawing/2014/main" id="{B0628146-486B-775E-2158-35EEA9C398BA}"/>
-              </a:ext>
-            </a:extLst>
-          </p:cNvPr>
-          <p:cNvSpPr txBox="1"/>
-          <p:nvPr/>
-        </p:nvSpPr>
-        <p:spPr>
-          <a:xfrm>
-            <a:off x="4724400" y="5567364"/>
-            <a:ext cx="566181" cy="523220"/>
-          </a:xfrm>
-          <a:prstGeom prst="rect">
-            <a:avLst/>
-          </a:prstGeom>
-          <a:noFill/>
-        </p:spPr>
-        <p:txBody>
-          <a:bodyPr wrap="none" rtlCol="0">
-            <a:spAutoFit/>
-          </a:bodyPr>
-          <a:lstStyle/>
-          <a:p>
-            <a:r>
-              <a:rPr lang="el-GR" sz="2800" dirty="0"/>
-              <a:t>Δ</a:t>
-            </a:r>
-            <a:r>
-              <a:rPr lang="pt-BR" sz="2800" dirty="0"/>
-              <a:t>E</a:t>
-            </a:r>
-          </a:p>
-        </p:txBody>
-      </p:sp>
-      <p:sp>
-        <p:nvSpPr>
-          <p:cNvPr id="12" name="CaixaDeTexto 11">
-            <a:extLst>
-              <a:ext uri="{FF2B5EF4-FFF2-40B4-BE49-F238E27FC236}">
-                <a16:creationId xmlns:a16="http://schemas.microsoft.com/office/drawing/2014/main" id="{FDD954E1-B0A3-F4EC-AAAF-1D0467022D90}"/>
-              </a:ext>
-            </a:extLst>
-          </p:cNvPr>
-          <p:cNvSpPr txBox="1"/>
-          <p:nvPr/>
-        </p:nvSpPr>
-        <p:spPr>
-          <a:xfrm>
-            <a:off x="2197656" y="3398980"/>
-            <a:ext cx="590226" cy="523220"/>
-          </a:xfrm>
-          <a:prstGeom prst="rect">
-            <a:avLst/>
-          </a:prstGeom>
-          <a:noFill/>
-        </p:spPr>
-        <p:txBody>
-          <a:bodyPr wrap="none" rtlCol="0">
-            <a:spAutoFit/>
-          </a:bodyPr>
-          <a:lstStyle/>
-          <a:p>
-            <a:r>
-              <a:rPr lang="el-GR" sz="2800" dirty="0"/>
-              <a:t>Δ</a:t>
-            </a:r>
-            <a:r>
-              <a:rPr lang="pt-BR" sz="2800" dirty="0"/>
-              <a:t>V</a:t>
-            </a:r>
-          </a:p>
-        </p:txBody>
-      </p:sp>
-      <p:sp>
-        <p:nvSpPr>
-          <p:cNvPr id="13" name="CaixaDeTexto 12">
-            <a:extLst>
-              <a:ext uri="{FF2B5EF4-FFF2-40B4-BE49-F238E27FC236}">
-                <a16:creationId xmlns:a16="http://schemas.microsoft.com/office/drawing/2014/main" id="{5E758E81-2037-719B-5256-B88A9DD4E3DF}"/>
-              </a:ext>
-            </a:extLst>
-          </p:cNvPr>
-          <p:cNvSpPr txBox="1"/>
-          <p:nvPr/>
-        </p:nvSpPr>
-        <p:spPr>
-          <a:xfrm>
-            <a:off x="2895881" y="1101025"/>
-            <a:ext cx="619080" cy="523220"/>
-          </a:xfrm>
-          <a:prstGeom prst="rect">
-            <a:avLst/>
-          </a:prstGeom>
-          <a:noFill/>
-        </p:spPr>
-        <p:txBody>
-          <a:bodyPr wrap="none" rtlCol="0">
-            <a:spAutoFit/>
-          </a:bodyPr>
-          <a:lstStyle/>
-          <a:p>
-            <a:r>
-              <a:rPr lang="el-GR" sz="2800" dirty="0"/>
-              <a:t>Δ</a:t>
-            </a:r>
-            <a:r>
-              <a:rPr lang="pt-BR" sz="2800" dirty="0"/>
-              <a:t>N</a:t>
-            </a:r>
-          </a:p>
-        </p:txBody>
-      </p:sp>
-      <p:cxnSp>
-        <p:nvCxnSpPr>
-          <p:cNvPr id="15" name="Conector reto 14">
-            <a:extLst>
-              <a:ext uri="{FF2B5EF4-FFF2-40B4-BE49-F238E27FC236}">
-                <a16:creationId xmlns:a16="http://schemas.microsoft.com/office/drawing/2014/main" id="{8A394189-B9E7-6EEF-C861-24BEEC02976E}"/>
-              </a:ext>
-            </a:extLst>
-          </p:cNvPr>
-          <p:cNvCxnSpPr>
-            <a:cxnSpLocks/>
-          </p:cNvCxnSpPr>
-          <p:nvPr/>
-        </p:nvCxnSpPr>
-        <p:spPr>
-          <a:xfrm flipH="1">
-            <a:off x="1068720" y="2643516"/>
-            <a:ext cx="1004047" cy="0"/>
-          </a:xfrm>
-          <a:prstGeom prst="line">
-            <a:avLst/>
-          </a:prstGeom>
-          <a:noFill/>
-          <a:ln w="19050">
-            <a:solidFill>
-              <a:schemeClr val="tx1"/>
-            </a:solidFill>
-            <a:headEnd type="arrow" w="med" len="med"/>
-            <a:tailEnd type="none" w="med" len="med"/>
-          </a:ln>
-        </p:spPr>
-        <p:style>
-          <a:lnRef idx="2">
-            <a:schemeClr val="accent1">
-              <a:shade val="15000"/>
-            </a:schemeClr>
-          </a:lnRef>
-          <a:fillRef idx="1">
-            <a:schemeClr val="accent1"/>
-          </a:fillRef>
-          <a:effectRef idx="0">
-            <a:schemeClr val="accent1"/>
-          </a:effectRef>
-          <a:fontRef idx="minor">
-            <a:schemeClr val="lt1"/>
-          </a:fontRef>
-        </p:style>
-      </p:cxnSp>
-      <p:cxnSp>
-        <p:nvCxnSpPr>
-          <p:cNvPr id="17" name="Conector reto 16">
-            <a:extLst>
-              <a:ext uri="{FF2B5EF4-FFF2-40B4-BE49-F238E27FC236}">
-                <a16:creationId xmlns:a16="http://schemas.microsoft.com/office/drawing/2014/main" id="{DF7AB916-4563-BDD8-5FB6-0220FD95FDC2}"/>
-              </a:ext>
-            </a:extLst>
-          </p:cNvPr>
-          <p:cNvCxnSpPr>
-            <a:cxnSpLocks/>
-          </p:cNvCxnSpPr>
-          <p:nvPr/>
-        </p:nvCxnSpPr>
-        <p:spPr>
-          <a:xfrm flipV="1">
-            <a:off x="1068720" y="1860750"/>
-            <a:ext cx="915234" cy="782766"/>
-          </a:xfrm>
-          <a:prstGeom prst="line">
-            <a:avLst/>
-          </a:prstGeom>
-          <a:noFill/>
-          <a:ln w="19050">
-            <a:solidFill>
-              <a:schemeClr val="tx1"/>
-            </a:solidFill>
-            <a:headEnd type="none" w="med" len="med"/>
-            <a:tailEnd type="arrow" w="med" len="med"/>
-          </a:ln>
-        </p:spPr>
-        <p:style>
-          <a:lnRef idx="2">
-            <a:schemeClr val="accent1">
-              <a:shade val="15000"/>
-            </a:schemeClr>
-          </a:lnRef>
-          <a:fillRef idx="1">
-            <a:schemeClr val="accent1"/>
-          </a:fillRef>
-          <a:effectRef idx="0">
-            <a:schemeClr val="accent1"/>
-          </a:effectRef>
-          <a:fontRef idx="minor">
-            <a:schemeClr val="lt1"/>
-          </a:fontRef>
-        </p:style>
-      </p:cxnSp>
-      <p:cxnSp>
-        <p:nvCxnSpPr>
-          <p:cNvPr id="22" name="Conector reto 21">
-            <a:extLst>
-              <a:ext uri="{FF2B5EF4-FFF2-40B4-BE49-F238E27FC236}">
-                <a16:creationId xmlns:a16="http://schemas.microsoft.com/office/drawing/2014/main" id="{7D18DAF8-ECFD-836A-C7BE-19CB9B87890D}"/>
-              </a:ext>
-            </a:extLst>
-          </p:cNvPr>
-          <p:cNvCxnSpPr>
-            <a:cxnSpLocks/>
-          </p:cNvCxnSpPr>
-          <p:nvPr/>
-        </p:nvCxnSpPr>
-        <p:spPr>
-          <a:xfrm flipV="1">
-            <a:off x="1073891" y="2652480"/>
-            <a:ext cx="0" cy="720914"/>
-          </a:xfrm>
-          <a:prstGeom prst="line">
-            <a:avLst/>
-          </a:prstGeom>
-          <a:noFill/>
-          <a:ln w="19050">
-            <a:solidFill>
-              <a:schemeClr val="tx1"/>
-            </a:solidFill>
-            <a:headEnd type="arrow" w="med" len="med"/>
-            <a:tailEnd type="none" w="med" len="med"/>
-          </a:ln>
-        </p:spPr>
-        <p:style>
-          <a:lnRef idx="2">
-            <a:schemeClr val="accent1">
-              <a:shade val="15000"/>
-            </a:schemeClr>
-          </a:lnRef>
-          <a:fillRef idx="1">
-            <a:schemeClr val="accent1"/>
-          </a:fillRef>
-          <a:effectRef idx="0">
-            <a:schemeClr val="accent1"/>
-          </a:effectRef>
-          <a:fontRef idx="minor">
-            <a:schemeClr val="lt1"/>
-          </a:fontRef>
-        </p:style>
-      </p:cxnSp>
-      <p:sp>
-        <p:nvSpPr>
-          <p:cNvPr id="24" name="CaixaDeTexto 23">
-            <a:extLst>
-              <a:ext uri="{FF2B5EF4-FFF2-40B4-BE49-F238E27FC236}">
-                <a16:creationId xmlns:a16="http://schemas.microsoft.com/office/drawing/2014/main" id="{51C1F51D-C02C-860F-8AF1-D5CBC8969C1C}"/>
-              </a:ext>
-            </a:extLst>
-          </p:cNvPr>
-          <p:cNvSpPr txBox="1"/>
-          <p:nvPr/>
-        </p:nvSpPr>
-        <p:spPr>
-          <a:xfrm>
-            <a:off x="1929720" y="1418790"/>
-            <a:ext cx="417102" cy="523220"/>
-          </a:xfrm>
-          <a:prstGeom prst="rect">
-            <a:avLst/>
-          </a:prstGeom>
-          <a:noFill/>
-        </p:spPr>
-        <p:txBody>
-          <a:bodyPr wrap="none" rtlCol="0">
-            <a:spAutoFit/>
-          </a:bodyPr>
-          <a:lstStyle/>
-          <a:p>
-            <a:r>
-              <a:rPr lang="pt-BR" sz="2800" dirty="0"/>
-              <a:t>N</a:t>
-            </a:r>
-          </a:p>
-        </p:txBody>
-      </p:sp>
-      <p:sp>
-        <p:nvSpPr>
-          <p:cNvPr id="25" name="CaixaDeTexto 24">
-            <a:extLst>
-              <a:ext uri="{FF2B5EF4-FFF2-40B4-BE49-F238E27FC236}">
-                <a16:creationId xmlns:a16="http://schemas.microsoft.com/office/drawing/2014/main" id="{9F1CE0A8-4F49-7595-4680-E9788214A859}"/>
-              </a:ext>
-            </a:extLst>
-          </p:cNvPr>
-          <p:cNvSpPr txBox="1"/>
-          <p:nvPr/>
-        </p:nvSpPr>
-        <p:spPr>
-          <a:xfrm>
-            <a:off x="2084930" y="2381906"/>
-            <a:ext cx="359394" cy="523220"/>
-          </a:xfrm>
-          <a:prstGeom prst="rect">
-            <a:avLst/>
-          </a:prstGeom>
-          <a:noFill/>
-        </p:spPr>
-        <p:txBody>
-          <a:bodyPr wrap="none" rtlCol="0">
-            <a:spAutoFit/>
-          </a:bodyPr>
-          <a:lstStyle/>
-          <a:p>
-            <a:r>
-              <a:rPr lang="pt-BR" sz="2800" dirty="0"/>
-              <a:t>E</a:t>
-            </a:r>
-          </a:p>
-        </p:txBody>
-      </p:sp>
-      <p:sp>
-        <p:nvSpPr>
-          <p:cNvPr id="26" name="CaixaDeTexto 25">
-            <a:extLst>
-              <a:ext uri="{FF2B5EF4-FFF2-40B4-BE49-F238E27FC236}">
-                <a16:creationId xmlns:a16="http://schemas.microsoft.com/office/drawing/2014/main" id="{F865F285-30B0-34A0-C501-D835F21A1C54}"/>
-              </a:ext>
-            </a:extLst>
-          </p:cNvPr>
-          <p:cNvSpPr txBox="1"/>
-          <p:nvPr/>
-        </p:nvSpPr>
-        <p:spPr>
-          <a:xfrm>
-            <a:off x="1196878" y="3111784"/>
-            <a:ext cx="388248" cy="523220"/>
-          </a:xfrm>
-          <a:prstGeom prst="rect">
-            <a:avLst/>
-          </a:prstGeom>
-          <a:noFill/>
-        </p:spPr>
-        <p:txBody>
-          <a:bodyPr wrap="none" rtlCol="0">
-            <a:spAutoFit/>
-          </a:bodyPr>
-          <a:lstStyle/>
-          <a:p>
-            <a:r>
-              <a:rPr lang="pt-BR" sz="2800" dirty="0"/>
-              <a:t>V</a:t>
-            </a:r>
-          </a:p>
-        </p:txBody>
-      </p:sp>
-      <p:sp>
-        <p:nvSpPr>
-          <p:cNvPr id="32" name="Forma Livre: Forma 31">
-            <a:extLst>
-              <a:ext uri="{FF2B5EF4-FFF2-40B4-BE49-F238E27FC236}">
-                <a16:creationId xmlns:a16="http://schemas.microsoft.com/office/drawing/2014/main" id="{B35FEC3B-936D-A4D3-3B92-37B11BAD12B3}"/>
-              </a:ext>
-            </a:extLst>
-          </p:cNvPr>
-          <p:cNvSpPr/>
-          <p:nvPr/>
-        </p:nvSpPr>
-        <p:spPr>
-          <a:xfrm>
-            <a:off x="2819400" y="838200"/>
-            <a:ext cx="5892800" cy="1439333"/>
-          </a:xfrm>
-          <a:custGeom>
-            <a:avLst/>
-            <a:gdLst>
-              <a:gd name="connsiteX0" fmla="*/ 0 w 5892800"/>
-              <a:gd name="connsiteY0" fmla="*/ 1439333 h 1439333"/>
-              <a:gd name="connsiteX1" fmla="*/ 2286000 w 5892800"/>
-              <a:gd name="connsiteY1" fmla="*/ 457200 h 1439333"/>
-              <a:gd name="connsiteX2" fmla="*/ 5892800 w 5892800"/>
-              <a:gd name="connsiteY2" fmla="*/ 0 h 1439333"/>
-              <a:gd name="connsiteX3" fmla="*/ 5892800 w 5892800"/>
-              <a:gd name="connsiteY3" fmla="*/ 0 h 1439333"/>
-            </a:gdLst>
-            <a:ahLst/>
-            <a:cxnLst>
-              <a:cxn ang="0">
-                <a:pos x="connsiteX0" y="connsiteY0"/>
-              </a:cxn>
-              <a:cxn ang="0">
-                <a:pos x="connsiteX1" y="connsiteY1"/>
-              </a:cxn>
-              <a:cxn ang="0">
-                <a:pos x="connsiteX2" y="connsiteY2"/>
-              </a:cxn>
-              <a:cxn ang="0">
-                <a:pos x="connsiteX3" y="connsiteY3"/>
-              </a:cxn>
-            </a:cxnLst>
-            <a:rect l="l" t="t" r="r" b="b"/>
-            <a:pathLst>
-              <a:path w="5892800" h="1439333">
-                <a:moveTo>
-                  <a:pt x="0" y="1439333"/>
-                </a:moveTo>
-                <a:cubicBezTo>
-                  <a:pt x="651933" y="1068211"/>
-                  <a:pt x="1303867" y="697089"/>
-                  <a:pt x="2286000" y="457200"/>
-                </a:cubicBezTo>
-                <a:cubicBezTo>
-                  <a:pt x="3268133" y="217311"/>
-                  <a:pt x="5892800" y="0"/>
-                  <a:pt x="5892800" y="0"/>
-                </a:cubicBezTo>
-                <a:lnTo>
-                  <a:pt x="5892800" y="0"/>
-                </a:lnTo>
-              </a:path>
-            </a:pathLst>
-          </a:custGeom>
-          <a:noFill/>
-          <a:ln w="38100">
-            <a:solidFill>
-              <a:schemeClr val="tx1"/>
-            </a:solidFill>
-            <a:prstDash val="sysDash"/>
-          </a:ln>
-        </p:spPr>
-        <p:style>
-          <a:lnRef idx="2">
-            <a:schemeClr val="accent1">
-              <a:shade val="15000"/>
-            </a:schemeClr>
-          </a:lnRef>
-          <a:fillRef idx="1">
-            <a:schemeClr val="accent1"/>
-          </a:fillRef>
-          <a:effectRef idx="0">
-            <a:schemeClr val="accent1"/>
-          </a:effectRef>
-          <a:fontRef idx="minor">
-            <a:schemeClr val="lt1"/>
-          </a:fontRef>
-        </p:style>
-        <p:txBody>
-          <a:bodyPr rtlCol="0" anchor="ctr"/>
-          <a:lstStyle/>
-          <a:p>
-            <a:pPr algn="ctr"/>
-            <a:endParaRPr lang="pt-BR"/>
-          </a:p>
-        </p:txBody>
-      </p:sp>
-      <p:sp>
-        <p:nvSpPr>
-          <p:cNvPr id="33" name="Forma Livre: Forma 32">
-            <a:extLst>
-              <a:ext uri="{FF2B5EF4-FFF2-40B4-BE49-F238E27FC236}">
-                <a16:creationId xmlns:a16="http://schemas.microsoft.com/office/drawing/2014/main" id="{7F87BB54-1D4C-0304-2E3A-9BC0DFB5494E}"/>
-              </a:ext>
-            </a:extLst>
-          </p:cNvPr>
-          <p:cNvSpPr/>
-          <p:nvPr/>
-        </p:nvSpPr>
-        <p:spPr>
-          <a:xfrm>
-            <a:off x="2802467" y="2252133"/>
-            <a:ext cx="5909733" cy="1761067"/>
-          </a:xfrm>
-          <a:custGeom>
-            <a:avLst/>
-            <a:gdLst>
-              <a:gd name="connsiteX0" fmla="*/ 0 w 5909733"/>
-              <a:gd name="connsiteY0" fmla="*/ 0 h 1761067"/>
-              <a:gd name="connsiteX1" fmla="*/ 990600 w 5909733"/>
-              <a:gd name="connsiteY1" fmla="*/ 838200 h 1761067"/>
-              <a:gd name="connsiteX2" fmla="*/ 3141133 w 5909733"/>
-              <a:gd name="connsiteY2" fmla="*/ 1354667 h 1761067"/>
-              <a:gd name="connsiteX3" fmla="*/ 5909733 w 5909733"/>
-              <a:gd name="connsiteY3" fmla="*/ 1761067 h 1761067"/>
-            </a:gdLst>
-            <a:ahLst/>
-            <a:cxnLst>
-              <a:cxn ang="0">
-                <a:pos x="connsiteX0" y="connsiteY0"/>
-              </a:cxn>
-              <a:cxn ang="0">
-                <a:pos x="connsiteX1" y="connsiteY1"/>
-              </a:cxn>
-              <a:cxn ang="0">
-                <a:pos x="connsiteX2" y="connsiteY2"/>
-              </a:cxn>
-              <a:cxn ang="0">
-                <a:pos x="connsiteX3" y="connsiteY3"/>
-              </a:cxn>
-            </a:cxnLst>
-            <a:rect l="l" t="t" r="r" b="b"/>
-            <a:pathLst>
-              <a:path w="5909733" h="1761067">
-                <a:moveTo>
-                  <a:pt x="0" y="0"/>
-                </a:moveTo>
-                <a:cubicBezTo>
-                  <a:pt x="233539" y="306211"/>
-                  <a:pt x="467078" y="612422"/>
-                  <a:pt x="990600" y="838200"/>
-                </a:cubicBezTo>
-                <a:cubicBezTo>
-                  <a:pt x="1514122" y="1063978"/>
-                  <a:pt x="2321278" y="1200856"/>
-                  <a:pt x="3141133" y="1354667"/>
-                </a:cubicBezTo>
-                <a:cubicBezTo>
-                  <a:pt x="3960989" y="1508478"/>
-                  <a:pt x="4935361" y="1634772"/>
-                  <a:pt x="5909733" y="1761067"/>
-                </a:cubicBezTo>
-              </a:path>
-            </a:pathLst>
-          </a:custGeom>
-          <a:noFill/>
-          <a:ln w="38100">
-            <a:solidFill>
-              <a:schemeClr val="tx1"/>
-            </a:solidFill>
-          </a:ln>
-        </p:spPr>
-        <p:style>
-          <a:lnRef idx="2">
-            <a:schemeClr val="accent1">
-              <a:shade val="15000"/>
-            </a:schemeClr>
-          </a:lnRef>
-          <a:fillRef idx="1">
-            <a:schemeClr val="accent1"/>
-          </a:fillRef>
-          <a:effectRef idx="0">
-            <a:schemeClr val="accent1"/>
-          </a:effectRef>
-          <a:fontRef idx="minor">
-            <a:schemeClr val="lt1"/>
-          </a:fontRef>
-        </p:style>
-        <p:txBody>
-          <a:bodyPr rtlCol="0" anchor="ctr"/>
-          <a:lstStyle/>
-          <a:p>
-            <a:pPr algn="ctr"/>
-            <a:endParaRPr lang="pt-BR"/>
-          </a:p>
-        </p:txBody>
-      </p:sp>
-      <p:sp>
-        <p:nvSpPr>
-          <p:cNvPr id="34" name="CaixaDeTexto 33">
-            <a:extLst>
-              <a:ext uri="{FF2B5EF4-FFF2-40B4-BE49-F238E27FC236}">
-                <a16:creationId xmlns:a16="http://schemas.microsoft.com/office/drawing/2014/main" id="{E3ADAB42-24F3-5765-73DE-74581800A00E}"/>
-              </a:ext>
-            </a:extLst>
-          </p:cNvPr>
-          <p:cNvSpPr txBox="1"/>
-          <p:nvPr/>
-        </p:nvSpPr>
-        <p:spPr>
-          <a:xfrm>
-            <a:off x="3908309" y="1112980"/>
-            <a:ext cx="489236" cy="461665"/>
-          </a:xfrm>
-          <a:prstGeom prst="rect">
-            <a:avLst/>
-          </a:prstGeom>
-          <a:noFill/>
-        </p:spPr>
-        <p:txBody>
-          <a:bodyPr wrap="none" rtlCol="0">
-            <a:spAutoFit/>
-          </a:bodyPr>
-          <a:lstStyle/>
-          <a:p>
-            <a:r>
-              <a:rPr lang="el-GR" sz="2400" dirty="0"/>
-              <a:t>φ</a:t>
-            </a:r>
-            <a:r>
-              <a:rPr lang="pt-BR" sz="2400" baseline="-25000" dirty="0"/>
-              <a:t>1</a:t>
-            </a:r>
-          </a:p>
-        </p:txBody>
-      </p:sp>
-      <p:sp>
-        <p:nvSpPr>
-          <p:cNvPr id="35" name="CaixaDeTexto 34">
-            <a:extLst>
-              <a:ext uri="{FF2B5EF4-FFF2-40B4-BE49-F238E27FC236}">
-                <a16:creationId xmlns:a16="http://schemas.microsoft.com/office/drawing/2014/main" id="{72BD8ED9-297D-67FB-4EB0-E730103DF7C2}"/>
-              </a:ext>
-            </a:extLst>
-          </p:cNvPr>
-          <p:cNvSpPr txBox="1"/>
-          <p:nvPr/>
-        </p:nvSpPr>
-        <p:spPr>
-          <a:xfrm>
-            <a:off x="2838211" y="2708145"/>
-            <a:ext cx="452368" cy="461665"/>
-          </a:xfrm>
-          <a:prstGeom prst="rect">
-            <a:avLst/>
-          </a:prstGeom>
-          <a:noFill/>
-        </p:spPr>
-        <p:txBody>
-          <a:bodyPr wrap="none" rtlCol="0">
-            <a:spAutoFit/>
-          </a:bodyPr>
-          <a:lstStyle/>
-          <a:p>
-            <a:r>
-              <a:rPr lang="el-GR" sz="2400" dirty="0"/>
-              <a:t>θ</a:t>
-            </a:r>
-            <a:r>
-              <a:rPr lang="pt-BR" sz="2400" baseline="-25000" dirty="0"/>
-              <a:t>1</a:t>
-            </a:r>
-          </a:p>
-        </p:txBody>
-      </p:sp>
-      <p:sp>
-        <p:nvSpPr>
-          <p:cNvPr id="36" name="CaixaDeTexto 35">
-            <a:extLst>
-              <a:ext uri="{FF2B5EF4-FFF2-40B4-BE49-F238E27FC236}">
-                <a16:creationId xmlns:a16="http://schemas.microsoft.com/office/drawing/2014/main" id="{11CCAF5E-0DD5-B88C-1406-943D72EFD8F7}"/>
-              </a:ext>
-            </a:extLst>
-          </p:cNvPr>
-          <p:cNvSpPr txBox="1"/>
-          <p:nvPr/>
-        </p:nvSpPr>
-        <p:spPr>
-          <a:xfrm>
-            <a:off x="9262373" y="203957"/>
-            <a:ext cx="489236" cy="461665"/>
-          </a:xfrm>
-          <a:prstGeom prst="rect">
-            <a:avLst/>
-          </a:prstGeom>
-          <a:noFill/>
-        </p:spPr>
-        <p:txBody>
-          <a:bodyPr wrap="none" rtlCol="0">
-            <a:spAutoFit/>
-          </a:bodyPr>
-          <a:lstStyle/>
-          <a:p>
-            <a:r>
-              <a:rPr lang="el-GR" sz="2400" dirty="0"/>
-              <a:t>φ</a:t>
-            </a:r>
-            <a:r>
-              <a:rPr lang="pt-BR" sz="2400" baseline="-25000" dirty="0"/>
-              <a:t>2</a:t>
-            </a:r>
-          </a:p>
-        </p:txBody>
-      </p:sp>
-      <p:sp>
-        <p:nvSpPr>
-          <p:cNvPr id="37" name="CaixaDeTexto 36">
-            <a:extLst>
-              <a:ext uri="{FF2B5EF4-FFF2-40B4-BE49-F238E27FC236}">
-                <a16:creationId xmlns:a16="http://schemas.microsoft.com/office/drawing/2014/main" id="{85D033D1-057A-127F-67C0-D4A5EB37D190}"/>
-              </a:ext>
-            </a:extLst>
-          </p:cNvPr>
-          <p:cNvSpPr txBox="1"/>
-          <p:nvPr/>
-        </p:nvSpPr>
-        <p:spPr>
-          <a:xfrm>
-            <a:off x="8870866" y="4161602"/>
-            <a:ext cx="452368" cy="461665"/>
-          </a:xfrm>
-          <a:prstGeom prst="rect">
-            <a:avLst/>
-          </a:prstGeom>
-          <a:noFill/>
-        </p:spPr>
-        <p:txBody>
-          <a:bodyPr wrap="none" rtlCol="0">
-            <a:spAutoFit/>
-          </a:bodyPr>
-          <a:lstStyle/>
-          <a:p>
-            <a:r>
-              <a:rPr lang="el-GR" sz="2400" dirty="0"/>
-              <a:t>θ</a:t>
-            </a:r>
-            <a:r>
-              <a:rPr lang="pt-BR" sz="2400" baseline="-25000" dirty="0"/>
-              <a:t>2</a:t>
-            </a:r>
-          </a:p>
-        </p:txBody>
-      </p:sp>
-      <p:sp>
-        <p:nvSpPr>
-          <p:cNvPr id="38" name="CaixaDeTexto 37">
-            <a:extLst>
-              <a:ext uri="{FF2B5EF4-FFF2-40B4-BE49-F238E27FC236}">
-                <a16:creationId xmlns:a16="http://schemas.microsoft.com/office/drawing/2014/main" id="{00301B9B-F6A5-9E67-50AC-6977DCEB4F14}"/>
-              </a:ext>
-            </a:extLst>
-          </p:cNvPr>
-          <p:cNvSpPr txBox="1"/>
-          <p:nvPr/>
-        </p:nvSpPr>
-        <p:spPr>
-          <a:xfrm>
-            <a:off x="5205579" y="3020611"/>
-            <a:ext cx="551754" cy="523220"/>
-          </a:xfrm>
-          <a:prstGeom prst="rect">
-            <a:avLst/>
-          </a:prstGeom>
-          <a:noFill/>
-        </p:spPr>
-        <p:txBody>
-          <a:bodyPr wrap="none" rtlCol="0">
-            <a:spAutoFit/>
-          </a:bodyPr>
-          <a:lstStyle/>
-          <a:p>
-            <a:r>
-              <a:rPr lang="el-GR" sz="2800" dirty="0"/>
-              <a:t>Δ</a:t>
-            </a:r>
-            <a:r>
-              <a:rPr lang="pt-BR" sz="2800" dirty="0"/>
-              <a:t>S</a:t>
-            </a:r>
-          </a:p>
-        </p:txBody>
-      </p:sp>
-      <p:sp>
-        <p:nvSpPr>
-          <p:cNvPr id="39" name="Arco 38">
-            <a:extLst>
-              <a:ext uri="{FF2B5EF4-FFF2-40B4-BE49-F238E27FC236}">
-                <a16:creationId xmlns:a16="http://schemas.microsoft.com/office/drawing/2014/main" id="{11F8EFB1-8AAE-A573-15FA-31E0FD450D7F}"/>
-              </a:ext>
-            </a:extLst>
-          </p:cNvPr>
-          <p:cNvSpPr/>
-          <p:nvPr/>
-        </p:nvSpPr>
-        <p:spPr>
-          <a:xfrm rot="5650816">
-            <a:off x="2491747" y="2036753"/>
-            <a:ext cx="722845" cy="756119"/>
-          </a:xfrm>
-          <a:prstGeom prst="arc">
-            <a:avLst>
-              <a:gd name="adj1" fmla="val 18422488"/>
-              <a:gd name="adj2" fmla="val 0"/>
-            </a:avLst>
-          </a:prstGeom>
-          <a:ln w="12700">
-            <a:solidFill>
-              <a:schemeClr val="tx1"/>
-            </a:solidFill>
-          </a:ln>
-        </p:spPr>
-        <p:style>
-          <a:lnRef idx="1">
-            <a:schemeClr val="accent1"/>
-          </a:lnRef>
-          <a:fillRef idx="0">
-            <a:schemeClr val="accent1"/>
-          </a:fillRef>
-          <a:effectRef idx="0">
-            <a:schemeClr val="accent1"/>
-          </a:effectRef>
-          <a:fontRef idx="minor">
-            <a:schemeClr val="tx1"/>
-          </a:fontRef>
-        </p:style>
-        <p:txBody>
-          <a:bodyPr rtlCol="0" anchor="ctr"/>
-          <a:lstStyle/>
-          <a:p>
-            <a:pPr algn="ctr"/>
-            <a:endParaRPr lang="pt-BR"/>
-          </a:p>
-        </p:txBody>
-      </p:sp>
-      <p:sp>
-        <p:nvSpPr>
-          <p:cNvPr id="40" name="Arco 39">
-            <a:extLst>
-              <a:ext uri="{FF2B5EF4-FFF2-40B4-BE49-F238E27FC236}">
-                <a16:creationId xmlns:a16="http://schemas.microsoft.com/office/drawing/2014/main" id="{0E23E099-535B-BFD8-6AB7-2B33705077D5}"/>
-              </a:ext>
-            </a:extLst>
-          </p:cNvPr>
-          <p:cNvSpPr/>
-          <p:nvPr/>
-        </p:nvSpPr>
-        <p:spPr>
-          <a:xfrm rot="19925123">
-            <a:off x="3387170" y="1430640"/>
-            <a:ext cx="722845" cy="756119"/>
-          </a:xfrm>
-          <a:prstGeom prst="arc">
-            <a:avLst>
-              <a:gd name="adj1" fmla="val 18422488"/>
-              <a:gd name="adj2" fmla="val 0"/>
-            </a:avLst>
-          </a:prstGeom>
-          <a:ln w="12700">
-            <a:solidFill>
-              <a:schemeClr val="tx1"/>
-            </a:solidFill>
-          </a:ln>
-        </p:spPr>
-        <p:style>
-          <a:lnRef idx="1">
-            <a:schemeClr val="accent1"/>
-          </a:lnRef>
-          <a:fillRef idx="0">
-            <a:schemeClr val="accent1"/>
-          </a:fillRef>
-          <a:effectRef idx="0">
-            <a:schemeClr val="accent1"/>
-          </a:effectRef>
-          <a:fontRef idx="minor">
-            <a:schemeClr val="tx1"/>
-          </a:fontRef>
-        </p:style>
-        <p:txBody>
-          <a:bodyPr rtlCol="0" anchor="ctr"/>
-          <a:lstStyle/>
-          <a:p>
-            <a:pPr algn="ctr"/>
-            <a:endParaRPr lang="pt-BR"/>
-          </a:p>
-        </p:txBody>
-      </p:sp>
-      <p:sp>
-        <p:nvSpPr>
-          <p:cNvPr id="41" name="Arco 40">
-            <a:extLst>
-              <a:ext uri="{FF2B5EF4-FFF2-40B4-BE49-F238E27FC236}">
-                <a16:creationId xmlns:a16="http://schemas.microsoft.com/office/drawing/2014/main" id="{EA46B7CC-FD49-EDE6-0E90-E590E23F3F4B}"/>
-              </a:ext>
-            </a:extLst>
-          </p:cNvPr>
-          <p:cNvSpPr/>
-          <p:nvPr/>
-        </p:nvSpPr>
-        <p:spPr>
-          <a:xfrm rot="19925123">
-            <a:off x="8544950" y="590781"/>
-            <a:ext cx="722845" cy="756119"/>
-          </a:xfrm>
-          <a:prstGeom prst="arc">
-            <a:avLst>
-              <a:gd name="adj1" fmla="val 18422488"/>
-              <a:gd name="adj2" fmla="val 21381862"/>
-            </a:avLst>
-          </a:prstGeom>
-          <a:ln w="12700">
-            <a:solidFill>
-              <a:schemeClr val="tx1"/>
-            </a:solidFill>
-          </a:ln>
-        </p:spPr>
-        <p:style>
-          <a:lnRef idx="1">
-            <a:schemeClr val="accent1"/>
-          </a:lnRef>
-          <a:fillRef idx="0">
-            <a:schemeClr val="accent1"/>
-          </a:fillRef>
-          <a:effectRef idx="0">
-            <a:schemeClr val="accent1"/>
-          </a:effectRef>
-          <a:fontRef idx="minor">
-            <a:schemeClr val="tx1"/>
-          </a:fontRef>
-        </p:style>
-        <p:txBody>
-          <a:bodyPr rtlCol="0" anchor="ctr"/>
-          <a:lstStyle/>
-          <a:p>
-            <a:pPr algn="ctr"/>
-            <a:endParaRPr lang="pt-BR"/>
-          </a:p>
-        </p:txBody>
-      </p:sp>
-      <p:cxnSp>
-        <p:nvCxnSpPr>
-          <p:cNvPr id="42" name="Conector reto 41">
-            <a:extLst>
-              <a:ext uri="{FF2B5EF4-FFF2-40B4-BE49-F238E27FC236}">
-                <a16:creationId xmlns:a16="http://schemas.microsoft.com/office/drawing/2014/main" id="{A974A345-79C6-BC6A-3402-496C38E270F6}"/>
-              </a:ext>
-            </a:extLst>
-          </p:cNvPr>
-          <p:cNvCxnSpPr>
-            <a:cxnSpLocks/>
-          </p:cNvCxnSpPr>
-          <p:nvPr/>
-        </p:nvCxnSpPr>
-        <p:spPr>
-          <a:xfrm flipV="1">
-            <a:off x="8736106" y="483495"/>
-            <a:ext cx="372637" cy="318703"/>
-          </a:xfrm>
-          <a:prstGeom prst="line">
-            <a:avLst/>
-          </a:prstGeom>
-          <a:noFill/>
-          <a:ln w="19050">
-            <a:solidFill>
-              <a:schemeClr val="tx1"/>
-            </a:solidFill>
-            <a:headEnd type="none" w="med" len="med"/>
-            <a:tailEnd type="none" w="med" len="med"/>
-          </a:ln>
-        </p:spPr>
-        <p:style>
-          <a:lnRef idx="2">
-            <a:schemeClr val="accent1">
-              <a:shade val="15000"/>
-            </a:schemeClr>
-          </a:lnRef>
-          <a:fillRef idx="1">
-            <a:schemeClr val="accent1"/>
-          </a:fillRef>
-          <a:effectRef idx="0">
-            <a:schemeClr val="accent1"/>
-          </a:effectRef>
-          <a:fontRef idx="minor">
-            <a:schemeClr val="lt1"/>
-          </a:fontRef>
-        </p:style>
-      </p:cxnSp>
-      <p:cxnSp>
-        <p:nvCxnSpPr>
-          <p:cNvPr id="44" name="Conector reto 43">
-            <a:extLst>
-              <a:ext uri="{FF2B5EF4-FFF2-40B4-BE49-F238E27FC236}">
-                <a16:creationId xmlns:a16="http://schemas.microsoft.com/office/drawing/2014/main" id="{605988CF-1A8E-F52B-5882-49F04B519788}"/>
-              </a:ext>
-            </a:extLst>
-          </p:cNvPr>
-          <p:cNvCxnSpPr/>
-          <p:nvPr/>
-        </p:nvCxnSpPr>
-        <p:spPr>
-          <a:xfrm flipV="1">
-            <a:off x="8740588" y="744071"/>
-            <a:ext cx="1062318" cy="76199"/>
-          </a:xfrm>
-          <a:prstGeom prst="line">
-            <a:avLst/>
-          </a:prstGeom>
-          <a:noFill/>
-          <a:ln w="19050">
-            <a:solidFill>
-              <a:schemeClr val="tx1"/>
-            </a:solidFill>
-            <a:prstDash val="sysDash"/>
-            <a:headEnd type="none" w="med" len="med"/>
-            <a:tailEnd type="none" w="med" len="med"/>
-          </a:ln>
-        </p:spPr>
-        <p:style>
-          <a:lnRef idx="2">
-            <a:schemeClr val="accent1">
-              <a:shade val="15000"/>
-            </a:schemeClr>
-          </a:lnRef>
-          <a:fillRef idx="1">
-            <a:schemeClr val="accent1"/>
-          </a:fillRef>
-          <a:effectRef idx="0">
-            <a:schemeClr val="accent1"/>
-          </a:effectRef>
-          <a:fontRef idx="minor">
-            <a:schemeClr val="lt1"/>
-          </a:fontRef>
-        </p:style>
-      </p:cxnSp>
-      <p:sp>
-        <p:nvSpPr>
-          <p:cNvPr id="46" name="Arco 45">
-            <a:extLst>
-              <a:ext uri="{FF2B5EF4-FFF2-40B4-BE49-F238E27FC236}">
-                <a16:creationId xmlns:a16="http://schemas.microsoft.com/office/drawing/2014/main" id="{3E9C81EA-372F-F3EC-2FB7-A4322DD8CC46}"/>
-              </a:ext>
-            </a:extLst>
-          </p:cNvPr>
-          <p:cNvSpPr/>
-          <p:nvPr/>
-        </p:nvSpPr>
-        <p:spPr>
-          <a:xfrm rot="5638934">
-            <a:off x="8379166" y="3473419"/>
-            <a:ext cx="722845" cy="756119"/>
-          </a:xfrm>
-          <a:prstGeom prst="arc">
-            <a:avLst>
-              <a:gd name="adj1" fmla="val 18422488"/>
-              <a:gd name="adj2" fmla="val 21381862"/>
-            </a:avLst>
-          </a:prstGeom>
-          <a:ln w="12700">
-            <a:solidFill>
-              <a:schemeClr val="tx1"/>
-            </a:solidFill>
-          </a:ln>
-        </p:spPr>
-        <p:style>
-          <a:lnRef idx="1">
-            <a:schemeClr val="accent1"/>
-          </a:lnRef>
-          <a:fillRef idx="0">
-            <a:schemeClr val="accent1"/>
-          </a:fillRef>
-          <a:effectRef idx="0">
-            <a:schemeClr val="accent1"/>
-          </a:effectRef>
-          <a:fontRef idx="minor">
-            <a:schemeClr val="tx1"/>
-          </a:fontRef>
-        </p:style>
-        <p:txBody>
-          <a:bodyPr rtlCol="0" anchor="ctr"/>
-          <a:lstStyle/>
-          <a:p>
-            <a:pPr algn="ctr"/>
-            <a:endParaRPr lang="pt-BR"/>
-          </a:p>
-        </p:txBody>
-      </p:sp>
-      <p:cxnSp>
-        <p:nvCxnSpPr>
-          <p:cNvPr id="47" name="Conector reto 46">
-            <a:extLst>
-              <a:ext uri="{FF2B5EF4-FFF2-40B4-BE49-F238E27FC236}">
-                <a16:creationId xmlns:a16="http://schemas.microsoft.com/office/drawing/2014/main" id="{427E2D03-3639-167A-6F2F-5CE28C36F15D}"/>
-              </a:ext>
-            </a:extLst>
-          </p:cNvPr>
-          <p:cNvCxnSpPr>
-            <a:cxnSpLocks/>
-          </p:cNvCxnSpPr>
-          <p:nvPr/>
-        </p:nvCxnSpPr>
-        <p:spPr>
-          <a:xfrm>
-            <a:off x="8742138" y="4048944"/>
-            <a:ext cx="4482" cy="569032"/>
-          </a:xfrm>
-          <a:prstGeom prst="line">
-            <a:avLst/>
-          </a:prstGeom>
-          <a:noFill/>
-          <a:ln w="19050">
-            <a:solidFill>
-              <a:schemeClr val="tx1"/>
-            </a:solidFill>
-            <a:headEnd type="none" w="med" len="med"/>
-            <a:tailEnd type="none" w="med" len="med"/>
-          </a:ln>
-        </p:spPr>
-        <p:style>
-          <a:lnRef idx="2">
-            <a:schemeClr val="accent1">
-              <a:shade val="15000"/>
-            </a:schemeClr>
-          </a:lnRef>
-          <a:fillRef idx="1">
-            <a:schemeClr val="accent1"/>
-          </a:fillRef>
-          <a:effectRef idx="0">
-            <a:schemeClr val="accent1"/>
-          </a:effectRef>
-          <a:fontRef idx="minor">
-            <a:schemeClr val="lt1"/>
-          </a:fontRef>
-        </p:style>
-      </p:cxnSp>
-      <p:cxnSp>
-        <p:nvCxnSpPr>
-          <p:cNvPr id="48" name="Conector reto 47">
-            <a:extLst>
-              <a:ext uri="{FF2B5EF4-FFF2-40B4-BE49-F238E27FC236}">
-                <a16:creationId xmlns:a16="http://schemas.microsoft.com/office/drawing/2014/main" id="{37A1ABE0-F393-2A50-202B-931BE9847F93}"/>
-              </a:ext>
-            </a:extLst>
-          </p:cNvPr>
-          <p:cNvCxnSpPr>
-            <a:cxnSpLocks/>
-          </p:cNvCxnSpPr>
-          <p:nvPr/>
-        </p:nvCxnSpPr>
-        <p:spPr>
-          <a:xfrm>
-            <a:off x="8771246" y="4036290"/>
-            <a:ext cx="1109354" cy="250624"/>
-          </a:xfrm>
-          <a:prstGeom prst="line">
-            <a:avLst/>
-          </a:prstGeom>
-          <a:noFill/>
-          <a:ln w="19050">
-            <a:solidFill>
-              <a:schemeClr val="tx1"/>
-            </a:solidFill>
-            <a:prstDash val="sysDash"/>
-            <a:headEnd type="none" w="med" len="med"/>
-            <a:tailEnd type="none" w="med" len="med"/>
-          </a:ln>
-        </p:spPr>
-        <p:style>
-          <a:lnRef idx="2">
-            <a:schemeClr val="accent1">
-              <a:shade val="15000"/>
-            </a:schemeClr>
-          </a:lnRef>
-          <a:fillRef idx="1">
-            <a:schemeClr val="accent1"/>
-          </a:fillRef>
-          <a:effectRef idx="0">
-            <a:schemeClr val="accent1"/>
-          </a:effectRef>
-          <a:fontRef idx="minor">
-            <a:schemeClr val="lt1"/>
-          </a:fontRef>
-        </p:style>
-      </p:cxnSp>
-      <p:cxnSp>
-        <p:nvCxnSpPr>
-          <p:cNvPr id="18" name="Conector reto 17">
-            <a:extLst>
-              <a:ext uri="{FF2B5EF4-FFF2-40B4-BE49-F238E27FC236}">
-                <a16:creationId xmlns:a16="http://schemas.microsoft.com/office/drawing/2014/main" id="{0DBA9DED-B487-6EDB-9BA6-3E66AC56D71F}"/>
-              </a:ext>
-            </a:extLst>
-          </p:cNvPr>
-          <p:cNvCxnSpPr>
-            <a:cxnSpLocks/>
-            <a:stCxn id="33" idx="0"/>
-          </p:cNvCxnSpPr>
-          <p:nvPr/>
-        </p:nvCxnSpPr>
-        <p:spPr>
-          <a:xfrm>
-            <a:off x="2802467" y="2252133"/>
-            <a:ext cx="1105842" cy="1382871"/>
-          </a:xfrm>
-          <a:prstGeom prst="line">
-            <a:avLst/>
-          </a:prstGeom>
-          <a:ln>
-            <a:solidFill>
-              <a:schemeClr val="tx1"/>
-            </a:solidFill>
-          </a:ln>
-        </p:spPr>
-        <p:style>
-          <a:lnRef idx="1">
-            <a:schemeClr val="accent1"/>
-          </a:lnRef>
-          <a:fillRef idx="0">
-            <a:schemeClr val="accent1"/>
-          </a:fillRef>
-          <a:effectRef idx="0">
-            <a:schemeClr val="accent1"/>
-          </a:effectRef>
-          <a:fontRef idx="minor">
-            <a:schemeClr val="tx1"/>
-          </a:fontRef>
-        </p:style>
-      </p:cxnSp>
-      <p:cxnSp>
-        <p:nvCxnSpPr>
-          <p:cNvPr id="19" name="Conector reto 18">
-            <a:extLst>
-              <a:ext uri="{FF2B5EF4-FFF2-40B4-BE49-F238E27FC236}">
-                <a16:creationId xmlns:a16="http://schemas.microsoft.com/office/drawing/2014/main" id="{B695E7B5-659F-A295-CFF2-4B4330661624}"/>
-              </a:ext>
-            </a:extLst>
-          </p:cNvPr>
-          <p:cNvCxnSpPr>
-            <a:cxnSpLocks/>
-            <a:endCxn id="4" idx="6"/>
-          </p:cNvCxnSpPr>
-          <p:nvPr/>
-        </p:nvCxnSpPr>
-        <p:spPr>
-          <a:xfrm>
-            <a:off x="3252232" y="3322320"/>
-            <a:ext cx="5560356" cy="713589"/>
-          </a:xfrm>
-          <a:prstGeom prst="line">
-            <a:avLst/>
-          </a:prstGeom>
-          <a:ln>
-            <a:solidFill>
-              <a:schemeClr val="tx1"/>
-            </a:solidFill>
-          </a:ln>
-        </p:spPr>
-        <p:style>
-          <a:lnRef idx="1">
-            <a:schemeClr val="accent1"/>
-          </a:lnRef>
-          <a:fillRef idx="0">
-            <a:schemeClr val="accent1"/>
-          </a:fillRef>
-          <a:effectRef idx="0">
-            <a:schemeClr val="accent1"/>
-          </a:effectRef>
-          <a:fontRef idx="minor">
-            <a:schemeClr val="tx1"/>
-          </a:fontRef>
-        </p:style>
-      </p:cxnSp>
-      <p:sp>
-        <p:nvSpPr>
-          <p:cNvPr id="31" name="Arco 30">
-            <a:extLst>
-              <a:ext uri="{FF2B5EF4-FFF2-40B4-BE49-F238E27FC236}">
-                <a16:creationId xmlns:a16="http://schemas.microsoft.com/office/drawing/2014/main" id="{90658202-2F01-1604-381B-6A0FE7788BD7}"/>
-              </a:ext>
-            </a:extLst>
-          </p:cNvPr>
-          <p:cNvSpPr/>
-          <p:nvPr/>
-        </p:nvSpPr>
-        <p:spPr>
-          <a:xfrm rot="5650816">
-            <a:off x="3449155" y="2791750"/>
-            <a:ext cx="722845" cy="756119"/>
-          </a:xfrm>
-          <a:prstGeom prst="arc">
-            <a:avLst>
-              <a:gd name="adj1" fmla="val 18621081"/>
-              <a:gd name="adj2" fmla="val 21186465"/>
-            </a:avLst>
-          </a:prstGeom>
-          <a:ln w="12700">
-            <a:solidFill>
-              <a:schemeClr val="tx1"/>
-            </a:solidFill>
-          </a:ln>
-        </p:spPr>
-        <p:style>
-          <a:lnRef idx="1">
-            <a:schemeClr val="accent1"/>
-          </a:lnRef>
-          <a:fillRef idx="0">
-            <a:schemeClr val="accent1"/>
-          </a:fillRef>
-          <a:effectRef idx="0">
-            <a:schemeClr val="accent1"/>
-          </a:effectRef>
-          <a:fontRef idx="minor">
-            <a:schemeClr val="tx1"/>
-          </a:fontRef>
-        </p:style>
-        <p:txBody>
-          <a:bodyPr rtlCol="0" anchor="ctr"/>
-          <a:lstStyle/>
-          <a:p>
-            <a:pPr algn="ctr"/>
-            <a:endParaRPr lang="pt-BR"/>
-          </a:p>
-        </p:txBody>
-      </p:sp>
-      <p:sp>
-        <p:nvSpPr>
-          <p:cNvPr id="43" name="CaixaDeTexto 42">
-            <a:extLst>
-              <a:ext uri="{FF2B5EF4-FFF2-40B4-BE49-F238E27FC236}">
-                <a16:creationId xmlns:a16="http://schemas.microsoft.com/office/drawing/2014/main" id="{565D442E-EA61-3E70-E82A-78B030922B70}"/>
-              </a:ext>
-            </a:extLst>
-          </p:cNvPr>
-          <p:cNvSpPr txBox="1"/>
-          <p:nvPr/>
-        </p:nvSpPr>
-        <p:spPr>
-          <a:xfrm>
-            <a:off x="3912791" y="3338793"/>
-            <a:ext cx="359394" cy="461665"/>
-          </a:xfrm>
-          <a:prstGeom prst="rect">
-            <a:avLst/>
-          </a:prstGeom>
-          <a:noFill/>
-        </p:spPr>
-        <p:txBody>
-          <a:bodyPr wrap="none" rtlCol="0">
-            <a:spAutoFit/>
-          </a:bodyPr>
-          <a:lstStyle/>
-          <a:p>
-            <a:r>
-              <a:rPr lang="el-GR" sz="2400" dirty="0"/>
-              <a:t>α</a:t>
-            </a:r>
-            <a:endParaRPr lang="pt-BR" sz="2400" dirty="0"/>
-          </a:p>
-        </p:txBody>
-      </p:sp>
     </p:spTree>
     <p:extLst>
       <p:ext uri="{BB962C8B-B14F-4D97-AF65-F5344CB8AC3E}">
-        <p14:creationId xmlns:p14="http://schemas.microsoft.com/office/powerpoint/2010/main" val="3395447863"/>
+        <p14:creationId xmlns:p14="http://schemas.microsoft.com/office/powerpoint/2010/main" val="528571596"/>
       </p:ext>
     </p:extLst>
   </p:cSld>

</xml_diff>